<commit_message>
Adds automation process slides and exercises
</commit_message>
<xml_diff>
--- a/presentaciones/Selenium, session 1.pptx
+++ b/presentaciones/Selenium, session 1.pptx
@@ -5,7 +5,7 @@
     <p:sldMasterId id="2147483664" r:id="rId1"/>
   </p:sldMasterIdLst>
   <p:notesMasterIdLst>
-    <p:notesMasterId r:id="rId28"/>
+    <p:notesMasterId r:id="rId33"/>
   </p:notesMasterIdLst>
   <p:sldIdLst>
     <p:sldId id="256" r:id="rId2"/>
@@ -24,16 +24,21 @@
     <p:sldId id="267" r:id="rId15"/>
     <p:sldId id="268" r:id="rId16"/>
     <p:sldId id="269" r:id="rId17"/>
-    <p:sldId id="270" r:id="rId18"/>
-    <p:sldId id="271" r:id="rId19"/>
-    <p:sldId id="272" r:id="rId20"/>
-    <p:sldId id="273" r:id="rId21"/>
-    <p:sldId id="283" r:id="rId22"/>
-    <p:sldId id="276" r:id="rId23"/>
-    <p:sldId id="278" r:id="rId24"/>
-    <p:sldId id="277" r:id="rId25"/>
-    <p:sldId id="279" r:id="rId26"/>
-    <p:sldId id="280" r:id="rId27"/>
+    <p:sldId id="284" r:id="rId18"/>
+    <p:sldId id="270" r:id="rId19"/>
+    <p:sldId id="271" r:id="rId20"/>
+    <p:sldId id="272" r:id="rId21"/>
+    <p:sldId id="273" r:id="rId22"/>
+    <p:sldId id="283" r:id="rId23"/>
+    <p:sldId id="285" r:id="rId24"/>
+    <p:sldId id="286" r:id="rId25"/>
+    <p:sldId id="287" r:id="rId26"/>
+    <p:sldId id="288" r:id="rId27"/>
+    <p:sldId id="276" r:id="rId28"/>
+    <p:sldId id="278" r:id="rId29"/>
+    <p:sldId id="277" r:id="rId30"/>
+    <p:sldId id="279" r:id="rId31"/>
+    <p:sldId id="280" r:id="rId32"/>
   </p:sldIdLst>
   <p:sldSz cx="12192000" cy="6858000"/>
   <p:notesSz cx="6858000" cy="9144000"/>
@@ -2641,8 +2646,8 @@
         </p:nvSpPr>
         <p:spPr>
           <a:xfrm>
-            <a:off x="1143225" y="685800"/>
-            <a:ext cx="4572225" cy="3429000"/>
+            <a:off x="381000" y="685800"/>
+            <a:ext cx="6096000" cy="3429000"/>
           </a:xfrm>
           <a:custGeom>
             <a:avLst/>
@@ -23769,7 +23774,7 @@
               <a:buNone/>
             </a:pPr>
             <a:r>
-              <a:rPr lang="es-ES" sz="5400" b="0" i="0" u="none" strike="noStrike" cap="none">
+              <a:rPr lang="es-ES" sz="5400" b="0" i="0" u="none" strike="noStrike" cap="none" dirty="0">
                 <a:solidFill>
                   <a:schemeClr val="accent1"/>
                 </a:solidFill>
@@ -23780,7 +23785,7 @@
               </a:rPr>
               <a:t>Selenium </a:t>
             </a:r>
-            <a:endParaRPr sz="5400" b="0" i="0" u="none" strike="noStrike" cap="none">
+            <a:endParaRPr sz="5400" b="0" i="0" u="none" strike="noStrike" cap="none" dirty="0">
               <a:solidFill>
                 <a:schemeClr val="accent1"/>
               </a:solidFill>
@@ -24069,7 +24074,7 @@
             </a:pPr>
             <a:r>
               <a:rPr lang="es-ES" dirty="0"/>
-              <a:t>Localización de Elementos de la Pagina </a:t>
+              <a:t>Localización de Elementos de la pagina </a:t>
             </a:r>
             <a:endParaRPr dirty="0"/>
           </a:p>
@@ -24164,31 +24169,7 @@
             </a:pPr>
             <a:r>
               <a:rPr lang="es-ES" sz="3200" dirty="0"/>
-              <a:t>Repaso HTML: DOM (</a:t>
-            </a:r>
-            <a:r>
-              <a:rPr lang="es-ES" sz="3200" dirty="0" err="1"/>
-              <a:t>Document</a:t>
-            </a:r>
-            <a:r>
-              <a:rPr lang="es-ES" sz="3200" dirty="0"/>
-              <a:t> </a:t>
-            </a:r>
-            <a:r>
-              <a:rPr lang="es-ES" sz="3200" dirty="0" err="1"/>
-              <a:t>Object</a:t>
-            </a:r>
-            <a:r>
-              <a:rPr lang="es-ES" sz="3200" dirty="0"/>
-              <a:t> </a:t>
-            </a:r>
-            <a:r>
-              <a:rPr lang="es-ES" sz="3200" dirty="0" err="1"/>
-              <a:t>Model</a:t>
-            </a:r>
-            <a:r>
-              <a:rPr lang="es-ES" sz="3200" dirty="0"/>
-              <a:t>)</a:t>
+              <a:t>Repaso HTML: DOM (Document Object Model)</a:t>
             </a:r>
             <a:endParaRPr sz="3200" dirty="0"/>
           </a:p>
@@ -24209,7 +24190,7 @@
         </p:blipFill>
         <p:spPr>
           <a:xfrm>
-            <a:off x="677334" y="1124276"/>
+            <a:off x="1094429" y="1429076"/>
             <a:ext cx="8345100" cy="5256000"/>
           </a:xfrm>
           <a:prstGeom prst="rect">
@@ -24268,20 +24249,8 @@
           <a:lstStyle/>
           <a:p>
             <a:r>
-              <a:rPr lang="en-US" dirty="0" err="1"/>
-              <a:t>Estructura</a:t>
-            </a:r>
-            <a:r>
               <a:rPr lang="en-US" dirty="0"/>
-              <a:t> </a:t>
-            </a:r>
-            <a:r>
-              <a:rPr lang="en-US" dirty="0" err="1"/>
-              <a:t>archivos</a:t>
-            </a:r>
-            <a:r>
-              <a:rPr lang="en-US" dirty="0"/>
-              <a:t> HTML</a:t>
+              <a:t>Estructura archivos HTML</a:t>
             </a:r>
           </a:p>
         </p:txBody>
@@ -24351,26 +24320,14 @@
           </a:p>
           <a:p>
             <a:r>
-              <a:rPr lang="en-US" dirty="0" err="1"/>
-              <a:t>Estructura</a:t>
-            </a:r>
-            <a:r>
               <a:rPr lang="en-US" dirty="0"/>
-              <a:t> de arbol</a:t>
+              <a:t>Estructura de arbol</a:t>
             </a:r>
           </a:p>
           <a:p>
             <a:r>
               <a:rPr lang="en-US" dirty="0"/>
-              <a:t>C es la </a:t>
-            </a:r>
-            <a:r>
-              <a:rPr lang="en-US" dirty="0" err="1"/>
-              <a:t>raiz</a:t>
-            </a:r>
-            <a:r>
-              <a:rPr lang="en-US" dirty="0"/>
-              <a:t>, o ‘/’</a:t>
+              <a:t>C es la raiz, o ‘/’</a:t>
             </a:r>
           </a:p>
           <a:p>
@@ -25678,6 +25635,111 @@
   <p:cSld>
     <p:spTree>
       <p:nvGrpSpPr>
+        <p:cNvPr id="1" name=""/>
+        <p:cNvGrpSpPr/>
+        <p:nvPr/>
+      </p:nvGrpSpPr>
+      <p:grpSpPr>
+        <a:xfrm>
+          <a:off x="0" y="0"/>
+          <a:ext cx="0" cy="0"/>
+          <a:chOff x="0" y="0"/>
+          <a:chExt cx="0" cy="0"/>
+        </a:xfrm>
+      </p:grpSpPr>
+      <p:sp>
+        <p:nvSpPr>
+          <p:cNvPr id="2" name="Título 1">
+            <a:extLst>
+              <a:ext uri="{FF2B5EF4-FFF2-40B4-BE49-F238E27FC236}">
+                <a16:creationId xmlns:a16="http://schemas.microsoft.com/office/drawing/2014/main" id="{C203BA8D-90B7-45B7-B21F-58E5EC3BD6B6}"/>
+              </a:ext>
+            </a:extLst>
+          </p:cNvPr>
+          <p:cNvSpPr>
+            <a:spLocks noGrp="1"/>
+          </p:cNvSpPr>
+          <p:nvPr>
+            <p:ph type="title"/>
+          </p:nvPr>
+        </p:nvSpPr>
+        <p:spPr/>
+        <p:txBody>
+          <a:bodyPr/>
+          <a:lstStyle/>
+          <a:p>
+            <a:r>
+              <a:rPr lang="en-US" dirty="0" err="1"/>
+              <a:t>Ejercicio</a:t>
+            </a:r>
+            <a:r>
+              <a:rPr lang="en-US" dirty="0"/>
+              <a:t>: </a:t>
+            </a:r>
+            <a:r>
+              <a:rPr lang="en-US" dirty="0" err="1"/>
+              <a:t>Identificar</a:t>
+            </a:r>
+            <a:r>
+              <a:rPr lang="en-US" dirty="0"/>
+              <a:t> </a:t>
+            </a:r>
+            <a:r>
+              <a:rPr lang="en-US" dirty="0" err="1"/>
+              <a:t>elementos</a:t>
+            </a:r>
+            <a:endParaRPr lang="en-US" dirty="0"/>
+          </a:p>
+        </p:txBody>
+      </p:sp>
+      <p:pic>
+        <p:nvPicPr>
+          <p:cNvPr id="4" name="Imagen 3">
+            <a:extLst>
+              <a:ext uri="{FF2B5EF4-FFF2-40B4-BE49-F238E27FC236}">
+                <a16:creationId xmlns:a16="http://schemas.microsoft.com/office/drawing/2014/main" id="{FB6C498A-3576-48B0-842C-A07B8C18674E}"/>
+              </a:ext>
+            </a:extLst>
+          </p:cNvPr>
+          <p:cNvPicPr>
+            <a:picLocks noChangeAspect="1"/>
+          </p:cNvPicPr>
+          <p:nvPr/>
+        </p:nvPicPr>
+        <p:blipFill>
+          <a:blip r:embed="rId2"/>
+          <a:stretch>
+            <a:fillRect/>
+          </a:stretch>
+        </p:blipFill>
+        <p:spPr>
+          <a:xfrm>
+            <a:off x="1112135" y="1401010"/>
+            <a:ext cx="9106685" cy="5223267"/>
+          </a:xfrm>
+          <a:prstGeom prst="rect">
+            <a:avLst/>
+          </a:prstGeom>
+        </p:spPr>
+      </p:pic>
+    </p:spTree>
+    <p:extLst>
+      <p:ext uri="{BB962C8B-B14F-4D97-AF65-F5344CB8AC3E}">
+        <p14:creationId xmlns:p14="http://schemas.microsoft.com/office/powerpoint/2010/main" val="371701704"/>
+      </p:ext>
+    </p:extLst>
+  </p:cSld>
+  <p:clrMapOvr>
+    <a:masterClrMapping/>
+  </p:clrMapOvr>
+</p:sld>
+</file>
+
+<file path=ppt/slides/slide18.xml><?xml version="1.0" encoding="utf-8"?>
+<p:sld xmlns:a="http://schemas.openxmlformats.org/drawingml/2006/main" xmlns:r="http://schemas.openxmlformats.org/officeDocument/2006/relationships" xmlns:p="http://schemas.openxmlformats.org/presentationml/2006/main">
+  <p:cSld>
+    <p:spTree>
+      <p:nvGrpSpPr>
         <p:cNvPr id="1" name="Shape 290"/>
         <p:cNvGrpSpPr/>
         <p:nvPr/>
@@ -25733,7 +25795,7 @@
               <a:buNone/>
             </a:pPr>
             <a:r>
-              <a:rPr lang="es-ES" sz="3600" b="0" i="0" u="none" strike="noStrike" cap="none">
+              <a:rPr lang="es-ES" sz="3600" b="0" i="0" u="none" strike="noStrike" cap="none" dirty="0">
                 <a:solidFill>
                   <a:schemeClr val="accent1"/>
                 </a:solidFill>
@@ -25744,7 +25806,7 @@
               </a:rPr>
               <a:t>Visión general de Selenium</a:t>
             </a:r>
-            <a:endParaRPr sz="3600" b="0" i="0" u="none" strike="noStrike" cap="none">
+            <a:endParaRPr sz="3600" b="0" i="0" u="none" strike="noStrike" cap="none" dirty="0">
               <a:solidFill>
                 <a:schemeClr val="accent1"/>
               </a:solidFill>
@@ -25997,7 +26059,7 @@
 </p:sld>
 </file>
 
-<file path=ppt/slides/slide18.xml><?xml version="1.0" encoding="utf-8"?>
+<file path=ppt/slides/slide19.xml><?xml version="1.0" encoding="utf-8"?>
 <p:sld xmlns:a="http://schemas.openxmlformats.org/drawingml/2006/main" xmlns:r="http://schemas.openxmlformats.org/officeDocument/2006/relationships" xmlns:p="http://schemas.openxmlformats.org/presentationml/2006/main">
   <p:cSld>
     <p:spTree>
@@ -26057,7 +26119,7 @@
               <a:buNone/>
             </a:pPr>
             <a:r>
-              <a:rPr lang="es-ES" sz="3600" b="0" i="0" u="none" strike="noStrike" cap="none">
+              <a:rPr lang="es-ES" sz="3600" b="0" i="0" u="none" strike="noStrike" cap="none" dirty="0">
                 <a:solidFill>
                   <a:schemeClr val="accent1"/>
                 </a:solidFill>
@@ -26068,7 +26130,7 @@
               </a:rPr>
               <a:t>Componentes de Selenium</a:t>
             </a:r>
-            <a:endParaRPr sz="3600" b="0" i="0" u="none" strike="noStrike" cap="none">
+            <a:endParaRPr sz="3600" b="0" i="0" u="none" strike="noStrike" cap="none" dirty="0">
               <a:solidFill>
                 <a:schemeClr val="accent1"/>
               </a:solidFill>
@@ -26178,7 +26240,7 @@
                 <a:buNone/>
               </a:pPr>
               <a:r>
-                <a:rPr lang="es-ES" sz="4500" b="0" i="0" u="none" strike="noStrike" cap="none">
+                <a:rPr lang="es-ES" sz="4500" b="0" i="0" u="none" strike="noStrike" cap="none" dirty="0">
                   <a:solidFill>
                     <a:schemeClr val="lt1"/>
                   </a:solidFill>
@@ -26189,7 +26251,7 @@
                 </a:rPr>
                 <a:t>Selenium IDE</a:t>
               </a:r>
-              <a:endParaRPr sz="4500" b="0" i="0" u="none" strike="noStrike" cap="none">
+              <a:endParaRPr sz="4500" b="0" i="0" u="none" strike="noStrike" cap="none" dirty="0">
                 <a:solidFill>
                   <a:schemeClr val="lt1"/>
                 </a:solidFill>
@@ -26285,7 +26347,7 @@
                 <a:buNone/>
               </a:pPr>
               <a:r>
-                <a:rPr lang="es-ES" sz="4500" b="0" i="0" u="none" strike="noStrike" cap="none">
+                <a:rPr lang="es-ES" sz="4500" b="0" i="0" u="none" strike="noStrike" cap="none" dirty="0">
                   <a:solidFill>
                     <a:schemeClr val="lt1"/>
                   </a:solidFill>
@@ -26296,7 +26358,7 @@
                 </a:rPr>
                 <a:t>Selenium RC</a:t>
               </a:r>
-              <a:endParaRPr sz="4500" b="0" i="0" u="none" strike="noStrike" cap="none">
+              <a:endParaRPr sz="4500" b="0" i="0" u="none" strike="noStrike" cap="none" dirty="0">
                 <a:solidFill>
                   <a:schemeClr val="lt1"/>
                 </a:solidFill>
@@ -26392,7 +26454,7 @@
                 <a:buNone/>
               </a:pPr>
               <a:r>
-                <a:rPr lang="es-ES" sz="4500" b="0" i="0" u="none" strike="noStrike" cap="none">
+                <a:rPr lang="es-ES" sz="4500" b="0" i="0" u="none" strike="noStrike" cap="none" dirty="0">
                   <a:solidFill>
                     <a:schemeClr val="lt1"/>
                   </a:solidFill>
@@ -26401,9 +26463,21 @@
                   <a:cs typeface="Trebuchet MS"/>
                   <a:sym typeface="Trebuchet MS"/>
                 </a:rPr>
-                <a:t>Selenium WebDriver</a:t>
+                <a:t>Selenium </a:t>
               </a:r>
-              <a:endParaRPr sz="4500" b="0" i="0" u="none" strike="noStrike" cap="none">
+              <a:r>
+                <a:rPr lang="es-ES" sz="4500" b="0" i="0" u="none" strike="noStrike" cap="none" dirty="0" err="1">
+                  <a:solidFill>
+                    <a:schemeClr val="lt1"/>
+                  </a:solidFill>
+                  <a:latin typeface="Trebuchet MS"/>
+                  <a:ea typeface="Trebuchet MS"/>
+                  <a:cs typeface="Trebuchet MS"/>
+                  <a:sym typeface="Trebuchet MS"/>
+                </a:rPr>
+                <a:t>WebDriver</a:t>
+              </a:r>
+              <a:endParaRPr sz="4500" b="0" i="0" u="none" strike="noStrike" cap="none" dirty="0">
                 <a:solidFill>
                   <a:schemeClr val="lt1"/>
                 </a:solidFill>
@@ -26499,7 +26573,7 @@
                 <a:buNone/>
               </a:pPr>
               <a:r>
-                <a:rPr lang="es-ES" sz="4500" b="0" i="0" u="none" strike="noStrike" cap="none">
+                <a:rPr lang="es-ES" sz="4500" b="0" i="0" u="none" strike="noStrike" cap="none" dirty="0">
                   <a:solidFill>
                     <a:schemeClr val="lt1"/>
                   </a:solidFill>
@@ -26510,7 +26584,7 @@
                 </a:rPr>
                 <a:t>Selenium GRID</a:t>
               </a:r>
-              <a:endParaRPr sz="4500" b="0" i="0" u="none" strike="noStrike" cap="none">
+              <a:endParaRPr sz="4500" b="0" i="0" u="none" strike="noStrike" cap="none" dirty="0">
                 <a:solidFill>
                   <a:schemeClr val="lt1"/>
                 </a:solidFill>
@@ -26523,384 +26597,6 @@
           </p:txBody>
         </p:sp>
       </p:grpSp>
-    </p:spTree>
-  </p:cSld>
-  <p:clrMapOvr>
-    <a:masterClrMapping/>
-  </p:clrMapOvr>
-</p:sld>
-</file>
-
-<file path=ppt/slides/slide19.xml><?xml version="1.0" encoding="utf-8"?>
-<p:sld xmlns:a="http://schemas.openxmlformats.org/drawingml/2006/main" xmlns:r="http://schemas.openxmlformats.org/officeDocument/2006/relationships" xmlns:p="http://schemas.openxmlformats.org/presentationml/2006/main">
-  <p:cSld>
-    <p:spTree>
-      <p:nvGrpSpPr>
-        <p:cNvPr id="1" name="Shape 310"/>
-        <p:cNvGrpSpPr/>
-        <p:nvPr/>
-      </p:nvGrpSpPr>
-      <p:grpSpPr>
-        <a:xfrm>
-          <a:off x="0" y="0"/>
-          <a:ext cx="0" cy="0"/>
-          <a:chOff x="0" y="0"/>
-          <a:chExt cx="0" cy="0"/>
-        </a:xfrm>
-      </p:grpSpPr>
-      <p:sp>
-        <p:nvSpPr>
-          <p:cNvPr id="311" name="Shape 311"/>
-          <p:cNvSpPr txBox="1">
-            <a:spLocks noGrp="1"/>
-          </p:cNvSpPr>
-          <p:nvPr>
-            <p:ph type="title"/>
-          </p:nvPr>
-        </p:nvSpPr>
-        <p:spPr>
-          <a:xfrm>
-            <a:off x="677334" y="609600"/>
-            <a:ext cx="8596668" cy="1320800"/>
-          </a:xfrm>
-          <a:prstGeom prst="rect">
-            <a:avLst/>
-          </a:prstGeom>
-          <a:noFill/>
-          <a:ln>
-            <a:noFill/>
-          </a:ln>
-        </p:spPr>
-        <p:txBody>
-          <a:bodyPr spcFirstLastPara="1" wrap="square" lIns="91425" tIns="45700" rIns="91425" bIns="45700" anchor="t" anchorCtr="0">
-            <a:noAutofit/>
-          </a:bodyPr>
-          <a:lstStyle/>
-          <a:p>
-            <a:pPr marL="0" marR="0" lvl="0" indent="0" algn="l" rtl="0">
-              <a:spcBef>
-                <a:spcPts val="0"/>
-              </a:spcBef>
-              <a:spcAft>
-                <a:spcPts val="0"/>
-              </a:spcAft>
-              <a:buClr>
-                <a:schemeClr val="accent1"/>
-              </a:buClr>
-              <a:buFont typeface="Trebuchet MS"/>
-              <a:buNone/>
-            </a:pPr>
-            <a:r>
-              <a:rPr lang="es-ES" sz="3600" b="0" i="0" u="none" strike="noStrike" cap="none">
-                <a:solidFill>
-                  <a:schemeClr val="accent1"/>
-                </a:solidFill>
-                <a:latin typeface="Trebuchet MS"/>
-                <a:ea typeface="Trebuchet MS"/>
-                <a:cs typeface="Trebuchet MS"/>
-                <a:sym typeface="Trebuchet MS"/>
-              </a:rPr>
-              <a:t>Selenium IDE </a:t>
-            </a:r>
-            <a:endParaRPr sz="3600" b="0" i="0" u="none" strike="noStrike" cap="none">
-              <a:solidFill>
-                <a:schemeClr val="accent1"/>
-              </a:solidFill>
-              <a:latin typeface="Trebuchet MS"/>
-              <a:ea typeface="Trebuchet MS"/>
-              <a:cs typeface="Trebuchet MS"/>
-              <a:sym typeface="Trebuchet MS"/>
-            </a:endParaRPr>
-          </a:p>
-        </p:txBody>
-      </p:sp>
-      <p:sp>
-        <p:nvSpPr>
-          <p:cNvPr id="312" name="Shape 312"/>
-          <p:cNvSpPr txBox="1">
-            <a:spLocks noGrp="1"/>
-          </p:cNvSpPr>
-          <p:nvPr>
-            <p:ph type="body" idx="1"/>
-          </p:nvPr>
-        </p:nvSpPr>
-        <p:spPr>
-          <a:xfrm>
-            <a:off x="971808" y="1504540"/>
-            <a:ext cx="6530802" cy="4110962"/>
-          </a:xfrm>
-          <a:prstGeom prst="rect">
-            <a:avLst/>
-          </a:prstGeom>
-          <a:noFill/>
-          <a:ln>
-            <a:noFill/>
-          </a:ln>
-        </p:spPr>
-        <p:txBody>
-          <a:bodyPr spcFirstLastPara="1" wrap="square" lIns="91425" tIns="45700" rIns="91425" bIns="45700" anchor="t" anchorCtr="0">
-            <a:noAutofit/>
-          </a:bodyPr>
-          <a:lstStyle/>
-          <a:p>
-            <a:pPr marL="342900" marR="0" lvl="0" indent="-342900" algn="l" rtl="0">
-              <a:spcBef>
-                <a:spcPts val="0"/>
-              </a:spcBef>
-              <a:spcAft>
-                <a:spcPts val="0"/>
-              </a:spcAft>
-              <a:buClr>
-                <a:schemeClr val="accent1"/>
-              </a:buClr>
-              <a:buSzPts val="1920"/>
-              <a:buFont typeface="Noto Sans Symbols"/>
-              <a:buChar char="▶"/>
-            </a:pPr>
-            <a:r>
-              <a:rPr lang="es-ES" sz="2400"/>
-              <a:t>Antiguamente un </a:t>
-            </a:r>
-            <a:r>
-              <a:rPr lang="es-ES" sz="2400" b="0" i="0" u="none" strike="noStrike" cap="none">
-                <a:solidFill>
-                  <a:srgbClr val="3F3F3F"/>
-                </a:solidFill>
-                <a:latin typeface="Trebuchet MS"/>
-                <a:ea typeface="Trebuchet MS"/>
-                <a:cs typeface="Trebuchet MS"/>
-                <a:sym typeface="Trebuchet MS"/>
-              </a:rPr>
-              <a:t>Plug in de Firefox ahora obsoleto</a:t>
-            </a:r>
-            <a:r>
-              <a:rPr lang="es-ES" sz="2400"/>
-              <a:t>.</a:t>
-            </a:r>
-            <a:endParaRPr sz="2400"/>
-          </a:p>
-          <a:p>
-            <a:pPr marL="342900" marR="0" lvl="0" indent="-373380" algn="l" rtl="0">
-              <a:spcBef>
-                <a:spcPts val="0"/>
-              </a:spcBef>
-              <a:spcAft>
-                <a:spcPts val="0"/>
-              </a:spcAft>
-              <a:buClr>
-                <a:schemeClr val="accent1"/>
-              </a:buClr>
-              <a:buSzPts val="2400"/>
-              <a:buFont typeface="Noto Sans Symbols"/>
-              <a:buChar char="▶"/>
-            </a:pPr>
-            <a:r>
-              <a:rPr lang="es-ES" sz="2400"/>
-              <a:t>Existen nuevas versiones para Chrome y Firefox: Selenium IDE y Kantu</a:t>
-            </a:r>
-            <a:endParaRPr sz="2400"/>
-          </a:p>
-          <a:p>
-            <a:pPr marL="342900" marR="0" lvl="0" indent="-342900" algn="l" rtl="0">
-              <a:spcBef>
-                <a:spcPts val="1000"/>
-              </a:spcBef>
-              <a:spcAft>
-                <a:spcPts val="0"/>
-              </a:spcAft>
-              <a:buClr>
-                <a:schemeClr val="accent1"/>
-              </a:buClr>
-              <a:buSzPts val="1920"/>
-              <a:buFont typeface="Noto Sans Symbols"/>
-              <a:buChar char="▶"/>
-            </a:pPr>
-            <a:r>
-              <a:rPr lang="es-ES" sz="2400" b="0" i="0" u="none" strike="noStrike" cap="none">
-                <a:solidFill>
-                  <a:srgbClr val="3F3F3F"/>
-                </a:solidFill>
-                <a:latin typeface="Trebuchet MS"/>
-                <a:ea typeface="Trebuchet MS"/>
-                <a:cs typeface="Trebuchet MS"/>
-                <a:sym typeface="Trebuchet MS"/>
-              </a:rPr>
-              <a:t>Permiten crear casos de prueba por medio de grabación</a:t>
-            </a:r>
-            <a:endParaRPr/>
-          </a:p>
-          <a:p>
-            <a:pPr marL="342900" marR="0" lvl="0" indent="-342900" algn="l" rtl="0">
-              <a:spcBef>
-                <a:spcPts val="1000"/>
-              </a:spcBef>
-              <a:spcAft>
-                <a:spcPts val="0"/>
-              </a:spcAft>
-              <a:buClr>
-                <a:schemeClr val="accent1"/>
-              </a:buClr>
-              <a:buSzPts val="1920"/>
-              <a:buFont typeface="Noto Sans Symbols"/>
-              <a:buChar char="▶"/>
-            </a:pPr>
-            <a:r>
-              <a:rPr lang="es-ES" sz="2400" b="0" i="0" u="none" strike="noStrike" cap="none">
-                <a:solidFill>
-                  <a:srgbClr val="3F3F3F"/>
-                </a:solidFill>
-                <a:latin typeface="Trebuchet MS"/>
-                <a:ea typeface="Trebuchet MS"/>
-                <a:cs typeface="Trebuchet MS"/>
-                <a:sym typeface="Trebuchet MS"/>
-              </a:rPr>
-              <a:t>Tiene capacidad de añadir verificaciones y </a:t>
-            </a:r>
-            <a:endParaRPr/>
-          </a:p>
-          <a:p>
-            <a:pPr marL="0" marR="0" lvl="0" indent="0" algn="l" rtl="0">
-              <a:spcBef>
-                <a:spcPts val="1000"/>
-              </a:spcBef>
-              <a:spcAft>
-                <a:spcPts val="0"/>
-              </a:spcAft>
-              <a:buClr>
-                <a:schemeClr val="accent1"/>
-              </a:buClr>
-              <a:buFont typeface="Noto Sans Symbols"/>
-              <a:buNone/>
-            </a:pPr>
-            <a:r>
-              <a:rPr lang="es-ES" sz="2400" b="0" i="0" u="none" strike="noStrike" cap="none">
-                <a:solidFill>
-                  <a:srgbClr val="3F3F3F"/>
-                </a:solidFill>
-                <a:latin typeface="Trebuchet MS"/>
-                <a:ea typeface="Trebuchet MS"/>
-                <a:cs typeface="Trebuchet MS"/>
-                <a:sym typeface="Trebuchet MS"/>
-              </a:rPr>
-              <a:t>aserciones</a:t>
-            </a:r>
-            <a:endParaRPr/>
-          </a:p>
-          <a:p>
-            <a:pPr marL="342900" marR="0" lvl="0" indent="-342900" algn="l" rtl="0">
-              <a:spcBef>
-                <a:spcPts val="1000"/>
-              </a:spcBef>
-              <a:spcAft>
-                <a:spcPts val="0"/>
-              </a:spcAft>
-              <a:buClr>
-                <a:schemeClr val="accent1"/>
-              </a:buClr>
-              <a:buSzPts val="1920"/>
-              <a:buFont typeface="Noto Sans Symbols"/>
-              <a:buChar char="▶"/>
-            </a:pPr>
-            <a:r>
-              <a:rPr lang="es-ES" sz="2400" b="0" i="0" u="none" strike="noStrike" cap="none">
-                <a:solidFill>
-                  <a:srgbClr val="3F3F3F"/>
-                </a:solidFill>
-                <a:latin typeface="Trebuchet MS"/>
-                <a:ea typeface="Trebuchet MS"/>
-                <a:cs typeface="Trebuchet MS"/>
-                <a:sym typeface="Trebuchet MS"/>
-              </a:rPr>
-              <a:t>Permite crear suites de prueba</a:t>
-            </a:r>
-            <a:endParaRPr/>
-          </a:p>
-          <a:p>
-            <a:pPr marL="342900" marR="0" lvl="0" indent="-342900" algn="l" rtl="0">
-              <a:spcBef>
-                <a:spcPts val="1000"/>
-              </a:spcBef>
-              <a:spcAft>
-                <a:spcPts val="0"/>
-              </a:spcAft>
-              <a:buClr>
-                <a:schemeClr val="accent1"/>
-              </a:buClr>
-              <a:buSzPts val="1920"/>
-              <a:buFont typeface="Noto Sans Symbols"/>
-              <a:buChar char="▶"/>
-            </a:pPr>
-            <a:r>
-              <a:rPr lang="es-ES" sz="2400" b="0" i="0" u="none" strike="noStrike" cap="none">
-                <a:solidFill>
-                  <a:srgbClr val="3F3F3F"/>
-                </a:solidFill>
-                <a:latin typeface="Trebuchet MS"/>
-                <a:ea typeface="Trebuchet MS"/>
-                <a:cs typeface="Trebuchet MS"/>
-                <a:sym typeface="Trebuchet MS"/>
-              </a:rPr>
-              <a:t>Permite la depuración de scripts</a:t>
-            </a:r>
-            <a:endParaRPr/>
-          </a:p>
-          <a:p>
-            <a:pPr marL="342900" marR="0" lvl="0" indent="-251459" algn="l" rtl="0">
-              <a:spcBef>
-                <a:spcPts val="1000"/>
-              </a:spcBef>
-              <a:spcAft>
-                <a:spcPts val="0"/>
-              </a:spcAft>
-              <a:buClr>
-                <a:schemeClr val="accent1"/>
-              </a:buClr>
-              <a:buSzPts val="1440"/>
-              <a:buFont typeface="Noto Sans Symbols"/>
-              <a:buNone/>
-            </a:pPr>
-            <a:endParaRPr sz="1800" b="0" i="0" u="none" strike="noStrike" cap="none">
-              <a:solidFill>
-                <a:srgbClr val="3F3F3F"/>
-              </a:solidFill>
-              <a:latin typeface="Trebuchet MS"/>
-              <a:ea typeface="Trebuchet MS"/>
-              <a:cs typeface="Trebuchet MS"/>
-              <a:sym typeface="Trebuchet MS"/>
-            </a:endParaRPr>
-          </a:p>
-        </p:txBody>
-      </p:sp>
-      <p:pic>
-        <p:nvPicPr>
-          <p:cNvPr id="2" name="Imagen 1">
-            <a:extLst>
-              <a:ext uri="{FF2B5EF4-FFF2-40B4-BE49-F238E27FC236}">
-                <a16:creationId xmlns:a16="http://schemas.microsoft.com/office/drawing/2014/main" id="{16A51992-1509-4B77-9D65-A58709107394}"/>
-              </a:ext>
-            </a:extLst>
-          </p:cNvPr>
-          <p:cNvPicPr>
-            <a:picLocks noChangeAspect="1"/>
-          </p:cNvPicPr>
-          <p:nvPr/>
-        </p:nvPicPr>
-        <p:blipFill>
-          <a:blip r:embed="rId3"/>
-          <a:stretch>
-            <a:fillRect/>
-          </a:stretch>
-        </p:blipFill>
-        <p:spPr>
-          <a:xfrm>
-            <a:off x="7456279" y="609600"/>
-            <a:ext cx="4058387" cy="4684644"/>
-          </a:xfrm>
-          <a:prstGeom prst="rect">
-            <a:avLst/>
-          </a:prstGeom>
-        </p:spPr>
-      </p:pic>
     </p:spTree>
   </p:cSld>
   <p:clrMapOvr>
@@ -27206,19 +26902,7 @@
                   <a:cs typeface="Calibri"/>
                   <a:sym typeface="Calibri"/>
                 </a:rPr>
-                <a:t>Visión general de </a:t>
-              </a:r>
-              <a:r>
-                <a:rPr lang="es-ES" sz="2500" b="0" i="0" u="none" strike="noStrike" cap="none" dirty="0" err="1">
-                  <a:solidFill>
-                    <a:schemeClr val="lt1"/>
-                  </a:solidFill>
-                  <a:latin typeface="Calibri"/>
-                  <a:ea typeface="Calibri"/>
-                  <a:cs typeface="Calibri"/>
-                  <a:sym typeface="Calibri"/>
-                </a:rPr>
-                <a:t>Selenium</a:t>
+                <a:t>Visión general de Selenium</a:t>
               </a:r>
               <a:endParaRPr sz="2500" b="0" i="0" u="none" strike="noStrike" cap="none" dirty="0">
                 <a:solidFill>
@@ -27432,19 +27116,7 @@
                   <a:cs typeface="Calibri"/>
                   <a:sym typeface="Calibri"/>
                 </a:rPr>
-                <a:t>HTML </a:t>
-              </a:r>
-              <a:r>
-                <a:rPr lang="es-ES" sz="2500" b="0" i="0" u="none" strike="noStrike" cap="none" dirty="0" err="1">
-                  <a:solidFill>
-                    <a:schemeClr val="lt1"/>
-                  </a:solidFill>
-                  <a:latin typeface="Calibri"/>
-                  <a:ea typeface="Calibri"/>
-                  <a:cs typeface="Calibri"/>
-                  <a:sym typeface="Calibri"/>
-                </a:rPr>
-                <a:t>Basico</a:t>
+                <a:t>HTML Básico</a:t>
               </a:r>
               <a:endParaRPr sz="2500" b="0" i="0" u="none" strike="noStrike" cap="none" dirty="0">
                 <a:solidFill>
@@ -27542,18 +27214,6 @@
                 <a:buNone/>
               </a:pPr>
               <a:r>
-                <a:rPr lang="es-ES" sz="2500" b="0" i="0" u="none" strike="noStrike" cap="none" dirty="0" err="1">
-                  <a:solidFill>
-                    <a:schemeClr val="lt1"/>
-                  </a:solidFill>
-                  <a:latin typeface="Calibri"/>
-                  <a:ea typeface="Calibri"/>
-                  <a:cs typeface="Calibri"/>
-                  <a:sym typeface="Calibri"/>
-                </a:rPr>
-                <a:t>Selenium</a:t>
-              </a:r>
-              <a:r>
                 <a:rPr lang="es-ES" sz="2500" b="0" i="0" u="none" strike="noStrike" cap="none" dirty="0">
                   <a:solidFill>
                     <a:schemeClr val="lt1"/>
@@ -27563,7 +27223,7 @@
                   <a:cs typeface="Calibri"/>
                   <a:sym typeface="Calibri"/>
                 </a:rPr>
-                <a:t> IDE</a:t>
+                <a:t>Selenium IDE</a:t>
               </a:r>
               <a:endParaRPr sz="2500" b="0" i="0" u="none" strike="noStrike" cap="none" dirty="0">
                 <a:solidFill>
@@ -27866,7 +27526,7 @@
                 <a:buNone/>
               </a:pPr>
               <a:r>
-                <a:rPr lang="es-ES" sz="2500" b="0" i="0" u="none" strike="noStrike" cap="none" dirty="0" err="1">
+                <a:rPr lang="es-ES" sz="2500" b="0" i="0" u="none" strike="noStrike" cap="none" dirty="0">
                   <a:solidFill>
                     <a:schemeClr val="lt1"/>
                   </a:solidFill>
@@ -27875,7 +27535,7 @@
                   <a:cs typeface="Calibri"/>
                   <a:sym typeface="Calibri"/>
                 </a:rPr>
-                <a:t>Github</a:t>
+                <a:t>GitHub</a:t>
               </a:r>
               <a:endParaRPr sz="2500" b="0" i="0" u="none" strike="noStrike" cap="none" dirty="0">
                 <a:solidFill>
@@ -28010,6 +27670,388 @@
   <p:cSld>
     <p:spTree>
       <p:nvGrpSpPr>
+        <p:cNvPr id="1" name="Shape 310"/>
+        <p:cNvGrpSpPr/>
+        <p:nvPr/>
+      </p:nvGrpSpPr>
+      <p:grpSpPr>
+        <a:xfrm>
+          <a:off x="0" y="0"/>
+          <a:ext cx="0" cy="0"/>
+          <a:chOff x="0" y="0"/>
+          <a:chExt cx="0" cy="0"/>
+        </a:xfrm>
+      </p:grpSpPr>
+      <p:sp>
+        <p:nvSpPr>
+          <p:cNvPr id="311" name="Shape 311"/>
+          <p:cNvSpPr txBox="1">
+            <a:spLocks noGrp="1"/>
+          </p:cNvSpPr>
+          <p:nvPr>
+            <p:ph type="title"/>
+          </p:nvPr>
+        </p:nvSpPr>
+        <p:spPr>
+          <a:xfrm>
+            <a:off x="677334" y="609600"/>
+            <a:ext cx="8596668" cy="1320800"/>
+          </a:xfrm>
+          <a:prstGeom prst="rect">
+            <a:avLst/>
+          </a:prstGeom>
+          <a:noFill/>
+          <a:ln>
+            <a:noFill/>
+          </a:ln>
+        </p:spPr>
+        <p:txBody>
+          <a:bodyPr spcFirstLastPara="1" wrap="square" lIns="91425" tIns="45700" rIns="91425" bIns="45700" anchor="t" anchorCtr="0">
+            <a:noAutofit/>
+          </a:bodyPr>
+          <a:lstStyle/>
+          <a:p>
+            <a:pPr marL="0" marR="0" lvl="0" indent="0" algn="l" rtl="0">
+              <a:spcBef>
+                <a:spcPts val="0"/>
+              </a:spcBef>
+              <a:spcAft>
+                <a:spcPts val="0"/>
+              </a:spcAft>
+              <a:buClr>
+                <a:schemeClr val="accent1"/>
+              </a:buClr>
+              <a:buFont typeface="Trebuchet MS"/>
+              <a:buNone/>
+            </a:pPr>
+            <a:r>
+              <a:rPr lang="es-ES" sz="3600" b="0" i="0" u="none" strike="noStrike" cap="none" dirty="0">
+                <a:solidFill>
+                  <a:schemeClr val="accent1"/>
+                </a:solidFill>
+                <a:latin typeface="Trebuchet MS"/>
+                <a:ea typeface="Trebuchet MS"/>
+                <a:cs typeface="Trebuchet MS"/>
+                <a:sym typeface="Trebuchet MS"/>
+              </a:rPr>
+              <a:t>Selenium IDE </a:t>
+            </a:r>
+            <a:endParaRPr sz="3600" b="0" i="0" u="none" strike="noStrike" cap="none" dirty="0">
+              <a:solidFill>
+                <a:schemeClr val="accent1"/>
+              </a:solidFill>
+              <a:latin typeface="Trebuchet MS"/>
+              <a:ea typeface="Trebuchet MS"/>
+              <a:cs typeface="Trebuchet MS"/>
+              <a:sym typeface="Trebuchet MS"/>
+            </a:endParaRPr>
+          </a:p>
+        </p:txBody>
+      </p:sp>
+      <p:sp>
+        <p:nvSpPr>
+          <p:cNvPr id="312" name="Shape 312"/>
+          <p:cNvSpPr txBox="1">
+            <a:spLocks noGrp="1"/>
+          </p:cNvSpPr>
+          <p:nvPr>
+            <p:ph type="body" idx="1"/>
+          </p:nvPr>
+        </p:nvSpPr>
+        <p:spPr>
+          <a:xfrm>
+            <a:off x="971808" y="1504540"/>
+            <a:ext cx="6530802" cy="4110962"/>
+          </a:xfrm>
+          <a:prstGeom prst="rect">
+            <a:avLst/>
+          </a:prstGeom>
+          <a:noFill/>
+          <a:ln>
+            <a:noFill/>
+          </a:ln>
+        </p:spPr>
+        <p:txBody>
+          <a:bodyPr spcFirstLastPara="1" wrap="square" lIns="91425" tIns="45700" rIns="91425" bIns="45700" anchor="t" anchorCtr="0">
+            <a:noAutofit/>
+          </a:bodyPr>
+          <a:lstStyle/>
+          <a:p>
+            <a:pPr marL="342900" marR="0" lvl="0" indent="-342900" algn="l" rtl="0">
+              <a:spcBef>
+                <a:spcPts val="0"/>
+              </a:spcBef>
+              <a:spcAft>
+                <a:spcPts val="0"/>
+              </a:spcAft>
+              <a:buClr>
+                <a:schemeClr val="accent1"/>
+              </a:buClr>
+              <a:buSzPts val="1920"/>
+              <a:buFont typeface="Noto Sans Symbols"/>
+              <a:buChar char="▶"/>
+            </a:pPr>
+            <a:r>
+              <a:rPr lang="es-ES" sz="2400" dirty="0"/>
+              <a:t>Antiguamente un </a:t>
+            </a:r>
+            <a:r>
+              <a:rPr lang="es-ES" sz="2400" b="0" i="0" u="none" strike="noStrike" cap="none" dirty="0">
+                <a:solidFill>
+                  <a:srgbClr val="3F3F3F"/>
+                </a:solidFill>
+                <a:latin typeface="Trebuchet MS"/>
+                <a:ea typeface="Trebuchet MS"/>
+                <a:cs typeface="Trebuchet MS"/>
+                <a:sym typeface="Trebuchet MS"/>
+              </a:rPr>
+              <a:t>Plug in de Firefox ahora obsoleto</a:t>
+            </a:r>
+            <a:r>
+              <a:rPr lang="es-ES" sz="2400" dirty="0"/>
+              <a:t>.</a:t>
+            </a:r>
+            <a:endParaRPr sz="2400" dirty="0"/>
+          </a:p>
+          <a:p>
+            <a:pPr marL="342900" marR="0" lvl="0" indent="-373380" algn="l" rtl="0">
+              <a:spcBef>
+                <a:spcPts val="0"/>
+              </a:spcBef>
+              <a:spcAft>
+                <a:spcPts val="0"/>
+              </a:spcAft>
+              <a:buClr>
+                <a:schemeClr val="accent1"/>
+              </a:buClr>
+              <a:buSzPts val="2400"/>
+              <a:buFont typeface="Noto Sans Symbols"/>
+              <a:buChar char="▶"/>
+            </a:pPr>
+            <a:r>
+              <a:rPr lang="es-ES" sz="2400" dirty="0"/>
+              <a:t>Existen nuevas versiones para Chrome y Firefox: Selenium IDE y </a:t>
+            </a:r>
+            <a:r>
+              <a:rPr lang="es-ES" sz="2400" dirty="0" err="1"/>
+              <a:t>Kantu</a:t>
+            </a:r>
+            <a:endParaRPr sz="2400" dirty="0"/>
+          </a:p>
+          <a:p>
+            <a:pPr marL="342900" marR="0" lvl="0" indent="-342900" algn="l" rtl="0">
+              <a:spcBef>
+                <a:spcPts val="1000"/>
+              </a:spcBef>
+              <a:spcAft>
+                <a:spcPts val="0"/>
+              </a:spcAft>
+              <a:buClr>
+                <a:schemeClr val="accent1"/>
+              </a:buClr>
+              <a:buSzPts val="1920"/>
+              <a:buFont typeface="Noto Sans Symbols"/>
+              <a:buChar char="▶"/>
+            </a:pPr>
+            <a:r>
+              <a:rPr lang="es-ES" sz="2400" b="0" i="0" u="none" strike="noStrike" cap="none" dirty="0">
+                <a:solidFill>
+                  <a:srgbClr val="3F3F3F"/>
+                </a:solidFill>
+                <a:latin typeface="Trebuchet MS"/>
+                <a:ea typeface="Trebuchet MS"/>
+                <a:cs typeface="Trebuchet MS"/>
+                <a:sym typeface="Trebuchet MS"/>
+              </a:rPr>
+              <a:t>Permiten crear casos de prueba por medio de grabación</a:t>
+            </a:r>
+            <a:endParaRPr dirty="0"/>
+          </a:p>
+          <a:p>
+            <a:pPr marL="342900" marR="0" lvl="0" indent="-342900" algn="l" rtl="0">
+              <a:spcBef>
+                <a:spcPts val="1000"/>
+              </a:spcBef>
+              <a:spcAft>
+                <a:spcPts val="0"/>
+              </a:spcAft>
+              <a:buClr>
+                <a:schemeClr val="accent1"/>
+              </a:buClr>
+              <a:buSzPts val="1920"/>
+              <a:buFont typeface="Noto Sans Symbols"/>
+              <a:buChar char="▶"/>
+            </a:pPr>
+            <a:r>
+              <a:rPr lang="es-ES" sz="2400" b="0" i="0" u="none" strike="noStrike" cap="none" dirty="0">
+                <a:solidFill>
+                  <a:srgbClr val="3F3F3F"/>
+                </a:solidFill>
+                <a:latin typeface="Trebuchet MS"/>
+                <a:ea typeface="Trebuchet MS"/>
+                <a:cs typeface="Trebuchet MS"/>
+                <a:sym typeface="Trebuchet MS"/>
+              </a:rPr>
+              <a:t>Tiene capacidad de añadir verificaciones y </a:t>
+            </a:r>
+            <a:endParaRPr dirty="0"/>
+          </a:p>
+          <a:p>
+            <a:pPr marL="0" marR="0" lvl="0" indent="0" algn="l" rtl="0">
+              <a:spcBef>
+                <a:spcPts val="1000"/>
+              </a:spcBef>
+              <a:spcAft>
+                <a:spcPts val="0"/>
+              </a:spcAft>
+              <a:buClr>
+                <a:schemeClr val="accent1"/>
+              </a:buClr>
+              <a:buFont typeface="Noto Sans Symbols"/>
+              <a:buNone/>
+            </a:pPr>
+            <a:r>
+              <a:rPr lang="es-ES" sz="2400" b="0" i="0" u="none" strike="noStrike" cap="none" dirty="0">
+                <a:solidFill>
+                  <a:srgbClr val="3F3F3F"/>
+                </a:solidFill>
+                <a:latin typeface="Trebuchet MS"/>
+                <a:ea typeface="Trebuchet MS"/>
+                <a:cs typeface="Trebuchet MS"/>
+                <a:sym typeface="Trebuchet MS"/>
+              </a:rPr>
+              <a:t>aserciones</a:t>
+            </a:r>
+            <a:endParaRPr dirty="0"/>
+          </a:p>
+          <a:p>
+            <a:pPr marL="342900" marR="0" lvl="0" indent="-342900" algn="l" rtl="0">
+              <a:spcBef>
+                <a:spcPts val="1000"/>
+              </a:spcBef>
+              <a:spcAft>
+                <a:spcPts val="0"/>
+              </a:spcAft>
+              <a:buClr>
+                <a:schemeClr val="accent1"/>
+              </a:buClr>
+              <a:buSzPts val="1920"/>
+              <a:buFont typeface="Noto Sans Symbols"/>
+              <a:buChar char="▶"/>
+            </a:pPr>
+            <a:r>
+              <a:rPr lang="es-ES" sz="2400" b="0" i="0" u="none" strike="noStrike" cap="none" dirty="0">
+                <a:solidFill>
+                  <a:srgbClr val="3F3F3F"/>
+                </a:solidFill>
+                <a:latin typeface="Trebuchet MS"/>
+                <a:ea typeface="Trebuchet MS"/>
+                <a:cs typeface="Trebuchet MS"/>
+                <a:sym typeface="Trebuchet MS"/>
+              </a:rPr>
+              <a:t>Permite crear suites de prueba</a:t>
+            </a:r>
+            <a:endParaRPr dirty="0"/>
+          </a:p>
+          <a:p>
+            <a:pPr marL="342900" marR="0" lvl="0" indent="-342900" algn="l" rtl="0">
+              <a:spcBef>
+                <a:spcPts val="1000"/>
+              </a:spcBef>
+              <a:spcAft>
+                <a:spcPts val="0"/>
+              </a:spcAft>
+              <a:buClr>
+                <a:schemeClr val="accent1"/>
+              </a:buClr>
+              <a:buSzPts val="1920"/>
+              <a:buFont typeface="Noto Sans Symbols"/>
+              <a:buChar char="▶"/>
+            </a:pPr>
+            <a:r>
+              <a:rPr lang="es-ES" sz="2400" b="0" i="0" u="none" strike="noStrike" cap="none" dirty="0">
+                <a:solidFill>
+                  <a:srgbClr val="3F3F3F"/>
+                </a:solidFill>
+                <a:latin typeface="Trebuchet MS"/>
+                <a:ea typeface="Trebuchet MS"/>
+                <a:cs typeface="Trebuchet MS"/>
+                <a:sym typeface="Trebuchet MS"/>
+              </a:rPr>
+              <a:t>Permite la depuración de scripts</a:t>
+            </a:r>
+            <a:endParaRPr dirty="0"/>
+          </a:p>
+          <a:p>
+            <a:pPr marL="342900" marR="0" lvl="0" indent="-251459" algn="l" rtl="0">
+              <a:spcBef>
+                <a:spcPts val="1000"/>
+              </a:spcBef>
+              <a:spcAft>
+                <a:spcPts val="0"/>
+              </a:spcAft>
+              <a:buClr>
+                <a:schemeClr val="accent1"/>
+              </a:buClr>
+              <a:buSzPts val="1440"/>
+              <a:buFont typeface="Noto Sans Symbols"/>
+              <a:buNone/>
+            </a:pPr>
+            <a:endParaRPr sz="1800" b="0" i="0" u="none" strike="noStrike" cap="none" dirty="0">
+              <a:solidFill>
+                <a:srgbClr val="3F3F3F"/>
+              </a:solidFill>
+              <a:latin typeface="Trebuchet MS"/>
+              <a:ea typeface="Trebuchet MS"/>
+              <a:cs typeface="Trebuchet MS"/>
+              <a:sym typeface="Trebuchet MS"/>
+            </a:endParaRPr>
+          </a:p>
+        </p:txBody>
+      </p:sp>
+      <p:pic>
+        <p:nvPicPr>
+          <p:cNvPr id="2" name="Imagen 1">
+            <a:extLst>
+              <a:ext uri="{FF2B5EF4-FFF2-40B4-BE49-F238E27FC236}">
+                <a16:creationId xmlns:a16="http://schemas.microsoft.com/office/drawing/2014/main" id="{16A51992-1509-4B77-9D65-A58709107394}"/>
+              </a:ext>
+            </a:extLst>
+          </p:cNvPr>
+          <p:cNvPicPr>
+            <a:picLocks noChangeAspect="1"/>
+          </p:cNvPicPr>
+          <p:nvPr/>
+        </p:nvPicPr>
+        <p:blipFill>
+          <a:blip r:embed="rId3"/>
+          <a:stretch>
+            <a:fillRect/>
+          </a:stretch>
+        </p:blipFill>
+        <p:spPr>
+          <a:xfrm>
+            <a:off x="7456279" y="609600"/>
+            <a:ext cx="4058387" cy="4684644"/>
+          </a:xfrm>
+          <a:prstGeom prst="rect">
+            <a:avLst/>
+          </a:prstGeom>
+        </p:spPr>
+      </p:pic>
+    </p:spTree>
+  </p:cSld>
+  <p:clrMapOvr>
+    <a:masterClrMapping/>
+  </p:clrMapOvr>
+</p:sld>
+</file>
+
+<file path=ppt/slides/slide21.xml><?xml version="1.0" encoding="utf-8"?>
+<p:sld xmlns:a="http://schemas.openxmlformats.org/drawingml/2006/main" xmlns:r="http://schemas.openxmlformats.org/officeDocument/2006/relationships" xmlns:p="http://schemas.openxmlformats.org/presentationml/2006/main">
+  <p:cSld>
+    <p:spTree>
+      <p:nvGrpSpPr>
         <p:cNvPr id="1" name="Shape 317"/>
         <p:cNvGrpSpPr/>
         <p:nvPr/>
@@ -28065,7 +28107,7 @@
               <a:buNone/>
             </a:pPr>
             <a:r>
-              <a:rPr lang="es-ES" sz="3600" b="0" i="0" u="none" strike="noStrike" cap="none">
+              <a:rPr lang="es-ES" sz="3600" b="0" i="0" u="none" strike="noStrike" cap="none" dirty="0">
                 <a:solidFill>
                   <a:schemeClr val="accent1"/>
                 </a:solidFill>
@@ -28076,7 +28118,7 @@
               </a:rPr>
               <a:t>Comandos de Selenium o “Selenio”</a:t>
             </a:r>
-            <a:endParaRPr sz="3600" b="0" i="0" u="none" strike="noStrike" cap="none">
+            <a:endParaRPr sz="3600" b="0" i="0" u="none" strike="noStrike" cap="none" dirty="0">
               <a:solidFill>
                 <a:schemeClr val="accent1"/>
               </a:solidFill>
@@ -28366,7 +28408,7 @@
 </p:sld>
 </file>
 
-<file path=ppt/slides/slide21.xml><?xml version="1.0" encoding="utf-8"?>
+<file path=ppt/slides/slide22.xml><?xml version="1.0" encoding="utf-8"?>
 <p:sld xmlns:a="http://schemas.openxmlformats.org/drawingml/2006/main" xmlns:r="http://schemas.openxmlformats.org/officeDocument/2006/relationships" xmlns:p="http://schemas.openxmlformats.org/presentationml/2006/main">
   <p:cSld>
     <p:spTree>
@@ -28519,7 +28561,419 @@
 </p:sld>
 </file>
 
-<file path=ppt/slides/slide22.xml><?xml version="1.0" encoding="utf-8"?>
+<file path=ppt/slides/slide23.xml><?xml version="1.0" encoding="utf-8"?>
+<p:sld xmlns:a="http://schemas.openxmlformats.org/drawingml/2006/main" xmlns:r="http://schemas.openxmlformats.org/officeDocument/2006/relationships" xmlns:p="http://schemas.openxmlformats.org/presentationml/2006/main">
+  <p:cSld>
+    <p:spTree>
+      <p:nvGrpSpPr>
+        <p:cNvPr id="1" name=""/>
+        <p:cNvGrpSpPr/>
+        <p:nvPr/>
+      </p:nvGrpSpPr>
+      <p:grpSpPr>
+        <a:xfrm>
+          <a:off x="0" y="0"/>
+          <a:ext cx="0" cy="0"/>
+          <a:chOff x="0" y="0"/>
+          <a:chExt cx="0" cy="0"/>
+        </a:xfrm>
+      </p:grpSpPr>
+      <p:sp>
+        <p:nvSpPr>
+          <p:cNvPr id="2" name="Título 1">
+            <a:extLst>
+              <a:ext uri="{FF2B5EF4-FFF2-40B4-BE49-F238E27FC236}">
+                <a16:creationId xmlns:a16="http://schemas.microsoft.com/office/drawing/2014/main" id="{841B74FB-9C84-4B5F-B87B-0CA46434B53F}"/>
+              </a:ext>
+            </a:extLst>
+          </p:cNvPr>
+          <p:cNvSpPr>
+            <a:spLocks noGrp="1"/>
+          </p:cNvSpPr>
+          <p:nvPr>
+            <p:ph type="title"/>
+          </p:nvPr>
+        </p:nvSpPr>
+        <p:spPr/>
+        <p:txBody>
+          <a:bodyPr/>
+          <a:lstStyle/>
+          <a:p>
+            <a:r>
+              <a:rPr lang="en-US" dirty="0"/>
+              <a:t>PA: </a:t>
+            </a:r>
+            <a:r>
+              <a:rPr lang="en-US" dirty="0" err="1"/>
+              <a:t>Crear</a:t>
+            </a:r>
+            <a:r>
+              <a:rPr lang="en-US" dirty="0"/>
+              <a:t> </a:t>
+            </a:r>
+            <a:r>
+              <a:rPr lang="en-US" dirty="0" err="1"/>
+              <a:t>pasos</a:t>
+            </a:r>
+            <a:r>
+              <a:rPr lang="en-US" dirty="0"/>
+              <a:t> de </a:t>
+            </a:r>
+            <a:r>
+              <a:rPr lang="en-US" dirty="0" err="1"/>
+              <a:t>prueba</a:t>
+            </a:r>
+            <a:endParaRPr lang="en-US" dirty="0"/>
+          </a:p>
+        </p:txBody>
+      </p:sp>
+      <p:pic>
+        <p:nvPicPr>
+          <p:cNvPr id="4" name="Imagen 3">
+            <a:extLst>
+              <a:ext uri="{FF2B5EF4-FFF2-40B4-BE49-F238E27FC236}">
+                <a16:creationId xmlns:a16="http://schemas.microsoft.com/office/drawing/2014/main" id="{4D0FB770-E55F-41C9-B761-FAB7C559D7F7}"/>
+              </a:ext>
+            </a:extLst>
+          </p:cNvPr>
+          <p:cNvPicPr>
+            <a:picLocks noChangeAspect="1"/>
+          </p:cNvPicPr>
+          <p:nvPr/>
+        </p:nvPicPr>
+        <p:blipFill>
+          <a:blip r:embed="rId2"/>
+          <a:stretch>
+            <a:fillRect/>
+          </a:stretch>
+        </p:blipFill>
+        <p:spPr>
+          <a:xfrm>
+            <a:off x="1599198" y="1409700"/>
+            <a:ext cx="6694570" cy="5091080"/>
+          </a:xfrm>
+          <a:prstGeom prst="rect">
+            <a:avLst/>
+          </a:prstGeom>
+        </p:spPr>
+      </p:pic>
+    </p:spTree>
+    <p:extLst>
+      <p:ext uri="{BB962C8B-B14F-4D97-AF65-F5344CB8AC3E}">
+        <p14:creationId xmlns:p14="http://schemas.microsoft.com/office/powerpoint/2010/main" val="3425456595"/>
+      </p:ext>
+    </p:extLst>
+  </p:cSld>
+  <p:clrMapOvr>
+    <a:masterClrMapping/>
+  </p:clrMapOvr>
+</p:sld>
+</file>
+
+<file path=ppt/slides/slide24.xml><?xml version="1.0" encoding="utf-8"?>
+<p:sld xmlns:a="http://schemas.openxmlformats.org/drawingml/2006/main" xmlns:r="http://schemas.openxmlformats.org/officeDocument/2006/relationships" xmlns:p="http://schemas.openxmlformats.org/presentationml/2006/main">
+  <p:cSld>
+    <p:spTree>
+      <p:nvGrpSpPr>
+        <p:cNvPr id="1" name=""/>
+        <p:cNvGrpSpPr/>
+        <p:nvPr/>
+      </p:nvGrpSpPr>
+      <p:grpSpPr>
+        <a:xfrm>
+          <a:off x="0" y="0"/>
+          <a:ext cx="0" cy="0"/>
+          <a:chOff x="0" y="0"/>
+          <a:chExt cx="0" cy="0"/>
+        </a:xfrm>
+      </p:grpSpPr>
+      <p:sp>
+        <p:nvSpPr>
+          <p:cNvPr id="2" name="Título 1">
+            <a:extLst>
+              <a:ext uri="{FF2B5EF4-FFF2-40B4-BE49-F238E27FC236}">
+                <a16:creationId xmlns:a16="http://schemas.microsoft.com/office/drawing/2014/main" id="{990B98E1-00C0-4345-B1F1-E38E3B3D93B5}"/>
+              </a:ext>
+            </a:extLst>
+          </p:cNvPr>
+          <p:cNvSpPr>
+            <a:spLocks noGrp="1"/>
+          </p:cNvSpPr>
+          <p:nvPr>
+            <p:ph type="title"/>
+          </p:nvPr>
+        </p:nvSpPr>
+        <p:spPr/>
+        <p:txBody>
+          <a:bodyPr/>
+          <a:lstStyle/>
+          <a:p>
+            <a:r>
+              <a:rPr lang="en-US" dirty="0"/>
+              <a:t>PA: </a:t>
+            </a:r>
+            <a:r>
+              <a:rPr lang="en-US" dirty="0" err="1"/>
+              <a:t>Complementacion</a:t>
+            </a:r>
+            <a:r>
+              <a:rPr lang="en-US" dirty="0"/>
+              <a:t> de las </a:t>
+            </a:r>
+            <a:r>
+              <a:rPr lang="en-US" dirty="0" err="1"/>
+              <a:t>pruebas</a:t>
+            </a:r>
+            <a:endParaRPr lang="en-US" dirty="0"/>
+          </a:p>
+        </p:txBody>
+      </p:sp>
+      <p:pic>
+        <p:nvPicPr>
+          <p:cNvPr id="4" name="Imagen 3">
+            <a:extLst>
+              <a:ext uri="{FF2B5EF4-FFF2-40B4-BE49-F238E27FC236}">
+                <a16:creationId xmlns:a16="http://schemas.microsoft.com/office/drawing/2014/main" id="{C092310D-1A1E-4270-9C4B-62F379510A7C}"/>
+              </a:ext>
+            </a:extLst>
+          </p:cNvPr>
+          <p:cNvPicPr>
+            <a:picLocks noChangeAspect="1"/>
+          </p:cNvPicPr>
+          <p:nvPr/>
+        </p:nvPicPr>
+        <p:blipFill>
+          <a:blip r:embed="rId2"/>
+          <a:stretch>
+            <a:fillRect/>
+          </a:stretch>
+        </p:blipFill>
+        <p:spPr>
+          <a:xfrm>
+            <a:off x="2539165" y="1390497"/>
+            <a:ext cx="5289383" cy="4971702"/>
+          </a:xfrm>
+          <a:prstGeom prst="rect">
+            <a:avLst/>
+          </a:prstGeom>
+        </p:spPr>
+      </p:pic>
+    </p:spTree>
+    <p:extLst>
+      <p:ext uri="{BB962C8B-B14F-4D97-AF65-F5344CB8AC3E}">
+        <p14:creationId xmlns:p14="http://schemas.microsoft.com/office/powerpoint/2010/main" val="3891586228"/>
+      </p:ext>
+    </p:extLst>
+  </p:cSld>
+  <p:clrMapOvr>
+    <a:masterClrMapping/>
+  </p:clrMapOvr>
+</p:sld>
+</file>
+
+<file path=ppt/slides/slide25.xml><?xml version="1.0" encoding="utf-8"?>
+<p:sld xmlns:a="http://schemas.openxmlformats.org/drawingml/2006/main" xmlns:r="http://schemas.openxmlformats.org/officeDocument/2006/relationships" xmlns:p="http://schemas.openxmlformats.org/presentationml/2006/main">
+  <p:cSld>
+    <p:spTree>
+      <p:nvGrpSpPr>
+        <p:cNvPr id="1" name=""/>
+        <p:cNvGrpSpPr/>
+        <p:nvPr/>
+      </p:nvGrpSpPr>
+      <p:grpSpPr>
+        <a:xfrm>
+          <a:off x="0" y="0"/>
+          <a:ext cx="0" cy="0"/>
+          <a:chOff x="0" y="0"/>
+          <a:chExt cx="0" cy="0"/>
+        </a:xfrm>
+      </p:grpSpPr>
+      <p:sp>
+        <p:nvSpPr>
+          <p:cNvPr id="2" name="Título 1">
+            <a:extLst>
+              <a:ext uri="{FF2B5EF4-FFF2-40B4-BE49-F238E27FC236}">
+                <a16:creationId xmlns:a16="http://schemas.microsoft.com/office/drawing/2014/main" id="{31614C91-B818-4B36-B860-F4631F195B0C}"/>
+              </a:ext>
+            </a:extLst>
+          </p:cNvPr>
+          <p:cNvSpPr>
+            <a:spLocks noGrp="1"/>
+          </p:cNvSpPr>
+          <p:nvPr>
+            <p:ph type="title"/>
+          </p:nvPr>
+        </p:nvSpPr>
+        <p:spPr/>
+        <p:txBody>
+          <a:bodyPr/>
+          <a:lstStyle/>
+          <a:p>
+            <a:r>
+              <a:rPr lang="en-US" dirty="0"/>
+              <a:t>PA: </a:t>
+            </a:r>
+            <a:r>
+              <a:rPr lang="en-US" dirty="0" err="1"/>
+              <a:t>Ejecucion</a:t>
+            </a:r>
+            <a:r>
+              <a:rPr lang="en-US" dirty="0"/>
+              <a:t> y </a:t>
+            </a:r>
+            <a:r>
+              <a:rPr lang="en-US" dirty="0" err="1"/>
+              <a:t>depuracion</a:t>
+            </a:r>
+            <a:endParaRPr lang="en-US" dirty="0"/>
+          </a:p>
+        </p:txBody>
+      </p:sp>
+      <p:pic>
+        <p:nvPicPr>
+          <p:cNvPr id="4" name="Imagen 3">
+            <a:extLst>
+              <a:ext uri="{FF2B5EF4-FFF2-40B4-BE49-F238E27FC236}">
+                <a16:creationId xmlns:a16="http://schemas.microsoft.com/office/drawing/2014/main" id="{A66C6594-52B1-4D23-BBB3-D14D07591901}"/>
+              </a:ext>
+            </a:extLst>
+          </p:cNvPr>
+          <p:cNvPicPr>
+            <a:picLocks noChangeAspect="1"/>
+          </p:cNvPicPr>
+          <p:nvPr/>
+        </p:nvPicPr>
+        <p:blipFill>
+          <a:blip r:embed="rId2"/>
+          <a:stretch>
+            <a:fillRect/>
+          </a:stretch>
+        </p:blipFill>
+        <p:spPr>
+          <a:xfrm>
+            <a:off x="2909887" y="1480686"/>
+            <a:ext cx="5271587" cy="4924876"/>
+          </a:xfrm>
+          <a:prstGeom prst="rect">
+            <a:avLst/>
+          </a:prstGeom>
+        </p:spPr>
+      </p:pic>
+    </p:spTree>
+    <p:extLst>
+      <p:ext uri="{BB962C8B-B14F-4D97-AF65-F5344CB8AC3E}">
+        <p14:creationId xmlns:p14="http://schemas.microsoft.com/office/powerpoint/2010/main" val="2648881788"/>
+      </p:ext>
+    </p:extLst>
+  </p:cSld>
+  <p:clrMapOvr>
+    <a:masterClrMapping/>
+  </p:clrMapOvr>
+</p:sld>
+</file>
+
+<file path=ppt/slides/slide26.xml><?xml version="1.0" encoding="utf-8"?>
+<p:sld xmlns:a="http://schemas.openxmlformats.org/drawingml/2006/main" xmlns:r="http://schemas.openxmlformats.org/officeDocument/2006/relationships" xmlns:p="http://schemas.openxmlformats.org/presentationml/2006/main">
+  <p:cSld>
+    <p:spTree>
+      <p:nvGrpSpPr>
+        <p:cNvPr id="1" name=""/>
+        <p:cNvGrpSpPr/>
+        <p:nvPr/>
+      </p:nvGrpSpPr>
+      <p:grpSpPr>
+        <a:xfrm>
+          <a:off x="0" y="0"/>
+          <a:ext cx="0" cy="0"/>
+          <a:chOff x="0" y="0"/>
+          <a:chExt cx="0" cy="0"/>
+        </a:xfrm>
+      </p:grpSpPr>
+      <p:sp>
+        <p:nvSpPr>
+          <p:cNvPr id="2" name="Título 1">
+            <a:extLst>
+              <a:ext uri="{FF2B5EF4-FFF2-40B4-BE49-F238E27FC236}">
+                <a16:creationId xmlns:a16="http://schemas.microsoft.com/office/drawing/2014/main" id="{4F4BF59A-309B-4D52-9271-732CC1142FAA}"/>
+              </a:ext>
+            </a:extLst>
+          </p:cNvPr>
+          <p:cNvSpPr>
+            <a:spLocks noGrp="1"/>
+          </p:cNvSpPr>
+          <p:nvPr>
+            <p:ph type="title"/>
+          </p:nvPr>
+        </p:nvSpPr>
+        <p:spPr/>
+        <p:txBody>
+          <a:bodyPr/>
+          <a:lstStyle/>
+          <a:p>
+            <a:r>
+              <a:rPr lang="en-US" dirty="0"/>
+              <a:t>PA: </a:t>
+            </a:r>
+            <a:r>
+              <a:rPr lang="en-US" dirty="0" err="1"/>
+              <a:t>Ejecucion</a:t>
+            </a:r>
+            <a:r>
+              <a:rPr lang="en-US" dirty="0"/>
+              <a:t> y </a:t>
+            </a:r>
+            <a:r>
+              <a:rPr lang="en-US" dirty="0" err="1"/>
+              <a:t>depuracion</a:t>
+            </a:r>
+            <a:endParaRPr lang="en-US" dirty="0"/>
+          </a:p>
+        </p:txBody>
+      </p:sp>
+      <p:pic>
+        <p:nvPicPr>
+          <p:cNvPr id="4" name="Imagen 3">
+            <a:extLst>
+              <a:ext uri="{FF2B5EF4-FFF2-40B4-BE49-F238E27FC236}">
+                <a16:creationId xmlns:a16="http://schemas.microsoft.com/office/drawing/2014/main" id="{86EFBCEA-26D2-45DF-975B-C6696A53AEF2}"/>
+              </a:ext>
+            </a:extLst>
+          </p:cNvPr>
+          <p:cNvPicPr>
+            <a:picLocks noChangeAspect="1"/>
+          </p:cNvPicPr>
+          <p:nvPr/>
+        </p:nvPicPr>
+        <p:blipFill>
+          <a:blip r:embed="rId2"/>
+          <a:stretch>
+            <a:fillRect/>
+          </a:stretch>
+        </p:blipFill>
+        <p:spPr>
+          <a:xfrm>
+            <a:off x="2717884" y="1514083"/>
+            <a:ext cx="5720264" cy="4995753"/>
+          </a:xfrm>
+          <a:prstGeom prst="rect">
+            <a:avLst/>
+          </a:prstGeom>
+        </p:spPr>
+      </p:pic>
+    </p:spTree>
+    <p:extLst>
+      <p:ext uri="{BB962C8B-B14F-4D97-AF65-F5344CB8AC3E}">
+        <p14:creationId xmlns:p14="http://schemas.microsoft.com/office/powerpoint/2010/main" val="2493520032"/>
+      </p:ext>
+    </p:extLst>
+  </p:cSld>
+  <p:clrMapOvr>
+    <a:masterClrMapping/>
+  </p:clrMapOvr>
+</p:sld>
+</file>
+
+<file path=ppt/slides/slide27.xml><?xml version="1.0" encoding="utf-8"?>
 <p:sld xmlns:a="http://schemas.openxmlformats.org/drawingml/2006/main" xmlns:r="http://schemas.openxmlformats.org/officeDocument/2006/relationships" xmlns:p="http://schemas.openxmlformats.org/presentationml/2006/main">
   <p:cSld>
     <p:spTree>
@@ -28629,15 +29083,7 @@
             </a:r>
             <a:r>
               <a:rPr lang="en-US" dirty="0"/>
-              <a:t> </a:t>
-            </a:r>
-            <a:r>
-              <a:rPr lang="en-US" dirty="0" err="1"/>
-              <a:t>archivos</a:t>
-            </a:r>
-            <a:r>
-              <a:rPr lang="en-US" dirty="0"/>
-              <a:t>.</a:t>
+              <a:t> archivos.</a:t>
             </a:r>
           </a:p>
           <a:p>
@@ -28738,7 +29184,7 @@
 </p:sld>
 </file>
 
-<file path=ppt/slides/slide23.xml><?xml version="1.0" encoding="utf-8"?>
+<file path=ppt/slides/slide28.xml><?xml version="1.0" encoding="utf-8"?>
 <p:sld xmlns:a="http://schemas.openxmlformats.org/drawingml/2006/main" xmlns:r="http://schemas.openxmlformats.org/officeDocument/2006/relationships" xmlns:p="http://schemas.openxmlformats.org/presentationml/2006/main">
   <p:cSld>
     <p:spTree>
@@ -28863,15 +29309,7 @@
           <a:p>
             <a:r>
               <a:rPr lang="en-US" dirty="0"/>
-              <a:t>Control de </a:t>
-            </a:r>
-            <a:r>
-              <a:rPr lang="en-US" dirty="0" err="1"/>
-              <a:t>archivos</a:t>
-            </a:r>
-            <a:r>
-              <a:rPr lang="en-US" dirty="0"/>
-              <a:t>:</a:t>
+              <a:t>Control de archivos:</a:t>
             </a:r>
           </a:p>
           <a:p>
@@ -28924,7 +29362,7 @@
 </p:sld>
 </file>
 
-<file path=ppt/slides/slide24.xml><?xml version="1.0" encoding="utf-8"?>
+<file path=ppt/slides/slide29.xml><?xml version="1.0" encoding="utf-8"?>
 <p:sld xmlns:a="http://schemas.openxmlformats.org/drawingml/2006/main" xmlns:r="http://schemas.openxmlformats.org/officeDocument/2006/relationships" xmlns:p="http://schemas.openxmlformats.org/presentationml/2006/main">
   <p:cSld>
     <p:spTree>
@@ -29038,7 +29476,621 @@
 </p:sld>
 </file>
 
-<file path=ppt/slides/slide25.xml><?xml version="1.0" encoding="utf-8"?>
+<file path=ppt/slides/slide3.xml><?xml version="1.0" encoding="utf-8"?>
+<p:sld xmlns:a="http://schemas.openxmlformats.org/drawingml/2006/main" xmlns:r="http://schemas.openxmlformats.org/officeDocument/2006/relationships" xmlns:p="http://schemas.openxmlformats.org/presentationml/2006/main">
+  <p:cSld>
+    <p:spTree>
+      <p:nvGrpSpPr>
+        <p:cNvPr id="1" name="Shape 173"/>
+        <p:cNvGrpSpPr/>
+        <p:nvPr/>
+      </p:nvGrpSpPr>
+      <p:grpSpPr>
+        <a:xfrm>
+          <a:off x="0" y="0"/>
+          <a:ext cx="0" cy="0"/>
+          <a:chOff x="0" y="0"/>
+          <a:chExt cx="0" cy="0"/>
+        </a:xfrm>
+      </p:grpSpPr>
+      <p:sp>
+        <p:nvSpPr>
+          <p:cNvPr id="174" name="Shape 174"/>
+          <p:cNvSpPr txBox="1">
+            <a:spLocks noGrp="1"/>
+          </p:cNvSpPr>
+          <p:nvPr>
+            <p:ph type="title"/>
+          </p:nvPr>
+        </p:nvSpPr>
+        <p:spPr>
+          <a:xfrm>
+            <a:off x="677334" y="609600"/>
+            <a:ext cx="8596668" cy="845713"/>
+          </a:xfrm>
+          <a:prstGeom prst="rect">
+            <a:avLst/>
+          </a:prstGeom>
+          <a:noFill/>
+          <a:ln>
+            <a:noFill/>
+          </a:ln>
+        </p:spPr>
+        <p:txBody>
+          <a:bodyPr spcFirstLastPara="1" wrap="square" lIns="91425" tIns="45700" rIns="91425" bIns="45700" anchor="t" anchorCtr="0">
+            <a:noAutofit/>
+          </a:bodyPr>
+          <a:lstStyle/>
+          <a:p>
+            <a:pPr marL="0" marR="0" lvl="0" indent="0" algn="l" rtl="0">
+              <a:spcBef>
+                <a:spcPts val="0"/>
+              </a:spcBef>
+              <a:spcAft>
+                <a:spcPts val="0"/>
+              </a:spcAft>
+              <a:buClr>
+                <a:schemeClr val="accent1"/>
+              </a:buClr>
+              <a:buFont typeface="Trebuchet MS"/>
+              <a:buNone/>
+            </a:pPr>
+            <a:r>
+              <a:rPr lang="es-ES" sz="3600" b="0" i="0" u="none" strike="noStrike" cap="none">
+                <a:solidFill>
+                  <a:schemeClr val="accent1"/>
+                </a:solidFill>
+                <a:latin typeface="Trebuchet MS"/>
+                <a:ea typeface="Trebuchet MS"/>
+                <a:cs typeface="Trebuchet MS"/>
+                <a:sym typeface="Trebuchet MS"/>
+              </a:rPr>
+              <a:t>Visión general de automatización</a:t>
+            </a:r>
+            <a:endParaRPr sz="3600" b="0" i="0" u="none" strike="noStrike" cap="none">
+              <a:solidFill>
+                <a:schemeClr val="accent1"/>
+              </a:solidFill>
+              <a:latin typeface="Trebuchet MS"/>
+              <a:ea typeface="Trebuchet MS"/>
+              <a:cs typeface="Trebuchet MS"/>
+              <a:sym typeface="Trebuchet MS"/>
+            </a:endParaRPr>
+          </a:p>
+        </p:txBody>
+      </p:sp>
+      <p:grpSp>
+        <p:nvGrpSpPr>
+          <p:cNvPr id="175" name="Shape 175"/>
+          <p:cNvGrpSpPr/>
+          <p:nvPr/>
+        </p:nvGrpSpPr>
+        <p:grpSpPr>
+          <a:xfrm>
+            <a:off x="677863" y="1700012"/>
+            <a:ext cx="8596312" cy="4342014"/>
+            <a:chOff x="0" y="0"/>
+            <a:chExt cx="8596312" cy="4342014"/>
+          </a:xfrm>
+        </p:grpSpPr>
+        <p:cxnSp>
+          <p:nvCxnSpPr>
+            <p:cNvPr id="176" name="Shape 176"/>
+            <p:cNvCxnSpPr/>
+            <p:nvPr/>
+          </p:nvCxnSpPr>
+          <p:spPr>
+            <a:xfrm>
+              <a:off x="0" y="0"/>
+              <a:ext cx="8596312" cy="0"/>
+            </a:xfrm>
+            <a:prstGeom prst="straightConnector1">
+              <a:avLst/>
+            </a:prstGeom>
+            <a:solidFill>
+              <a:srgbClr val="90C223"/>
+            </a:solidFill>
+            <a:ln w="19050" cap="rnd" cmpd="sng">
+              <a:solidFill>
+                <a:srgbClr val="90C223"/>
+              </a:solidFill>
+              <a:prstDash val="solid"/>
+              <a:round/>
+              <a:headEnd type="none" w="sm" len="sm"/>
+              <a:tailEnd type="none" w="sm" len="sm"/>
+            </a:ln>
+          </p:spPr>
+        </p:cxnSp>
+        <p:sp>
+          <p:nvSpPr>
+            <p:cNvPr id="177" name="Shape 177"/>
+            <p:cNvSpPr/>
+            <p:nvPr/>
+          </p:nvSpPr>
+          <p:spPr>
+            <a:xfrm>
+              <a:off x="0" y="0"/>
+              <a:ext cx="1719262" cy="4342014"/>
+            </a:xfrm>
+            <a:prstGeom prst="rect">
+              <a:avLst/>
+            </a:prstGeom>
+            <a:noFill/>
+            <a:ln>
+              <a:noFill/>
+            </a:ln>
+          </p:spPr>
+          <p:txBody>
+            <a:bodyPr spcFirstLastPara="1" wrap="square" lIns="91425" tIns="91425" rIns="91425" bIns="91425" anchor="ctr" anchorCtr="0">
+              <a:noAutofit/>
+            </a:bodyPr>
+            <a:lstStyle/>
+            <a:p>
+              <a:pPr marL="0" lvl="0" indent="0">
+                <a:spcBef>
+                  <a:spcPts val="0"/>
+                </a:spcBef>
+                <a:spcAft>
+                  <a:spcPts val="0"/>
+                </a:spcAft>
+                <a:buNone/>
+              </a:pPr>
+              <a:endParaRPr/>
+            </a:p>
+          </p:txBody>
+        </p:sp>
+        <p:sp>
+          <p:nvSpPr>
+            <p:cNvPr id="178" name="Shape 178"/>
+            <p:cNvSpPr txBox="1"/>
+            <p:nvPr/>
+          </p:nvSpPr>
+          <p:spPr>
+            <a:xfrm>
+              <a:off x="0" y="0"/>
+              <a:ext cx="1719262" cy="4342014"/>
+            </a:xfrm>
+            <a:prstGeom prst="rect">
+              <a:avLst/>
+            </a:prstGeom>
+            <a:noFill/>
+            <a:ln>
+              <a:noFill/>
+            </a:ln>
+          </p:spPr>
+          <p:txBody>
+            <a:bodyPr spcFirstLastPara="1" wrap="square" lIns="64750" tIns="64750" rIns="64750" bIns="64750" anchor="t" anchorCtr="0">
+              <a:noAutofit/>
+            </a:bodyPr>
+            <a:lstStyle/>
+            <a:p>
+              <a:pPr marL="0" marR="0" lvl="0" indent="0" algn="l" rtl="0">
+                <a:lnSpc>
+                  <a:spcPct val="90000"/>
+                </a:lnSpc>
+                <a:spcBef>
+                  <a:spcPts val="0"/>
+                </a:spcBef>
+                <a:spcAft>
+                  <a:spcPts val="0"/>
+                </a:spcAft>
+                <a:buNone/>
+              </a:pPr>
+              <a:r>
+                <a:rPr lang="es-ES" sz="1700" b="0" i="0" u="none" strike="noStrike" cap="none">
+                  <a:solidFill>
+                    <a:schemeClr val="dk1"/>
+                  </a:solidFill>
+                  <a:latin typeface="Trebuchet MS"/>
+                  <a:ea typeface="Trebuchet MS"/>
+                  <a:cs typeface="Trebuchet MS"/>
+                  <a:sym typeface="Trebuchet MS"/>
+                </a:rPr>
+                <a:t>Visión general de Automatización</a:t>
+              </a:r>
+              <a:endParaRPr sz="1700" b="0" i="0" u="none" strike="noStrike" cap="none">
+                <a:solidFill>
+                  <a:schemeClr val="dk1"/>
+                </a:solidFill>
+                <a:latin typeface="Trebuchet MS"/>
+                <a:ea typeface="Trebuchet MS"/>
+                <a:cs typeface="Trebuchet MS"/>
+                <a:sym typeface="Trebuchet MS"/>
+              </a:endParaRPr>
+            </a:p>
+          </p:txBody>
+        </p:sp>
+        <p:sp>
+          <p:nvSpPr>
+            <p:cNvPr id="179" name="Shape 179"/>
+            <p:cNvSpPr/>
+            <p:nvPr/>
+          </p:nvSpPr>
+          <p:spPr>
+            <a:xfrm>
+              <a:off x="1848207" y="67843"/>
+              <a:ext cx="6748104" cy="1356879"/>
+            </a:xfrm>
+            <a:prstGeom prst="rect">
+              <a:avLst/>
+            </a:prstGeom>
+            <a:noFill/>
+            <a:ln>
+              <a:noFill/>
+            </a:ln>
+          </p:spPr>
+          <p:txBody>
+            <a:bodyPr spcFirstLastPara="1" wrap="square" lIns="91425" tIns="91425" rIns="91425" bIns="91425" anchor="ctr" anchorCtr="0">
+              <a:noAutofit/>
+            </a:bodyPr>
+            <a:lstStyle/>
+            <a:p>
+              <a:pPr marL="0" lvl="0" indent="0">
+                <a:spcBef>
+                  <a:spcPts val="0"/>
+                </a:spcBef>
+                <a:spcAft>
+                  <a:spcPts val="0"/>
+                </a:spcAft>
+                <a:buNone/>
+              </a:pPr>
+              <a:endParaRPr/>
+            </a:p>
+          </p:txBody>
+        </p:sp>
+        <p:sp>
+          <p:nvSpPr>
+            <p:cNvPr id="180" name="Shape 180"/>
+            <p:cNvSpPr txBox="1"/>
+            <p:nvPr/>
+          </p:nvSpPr>
+          <p:spPr>
+            <a:xfrm>
+              <a:off x="1848207" y="67843"/>
+              <a:ext cx="6748104" cy="1356879"/>
+            </a:xfrm>
+            <a:prstGeom prst="rect">
+              <a:avLst/>
+            </a:prstGeom>
+            <a:noFill/>
+            <a:ln>
+              <a:noFill/>
+            </a:ln>
+          </p:spPr>
+          <p:txBody>
+            <a:bodyPr spcFirstLastPara="1" wrap="square" lIns="129525" tIns="129525" rIns="129525" bIns="129525" anchor="t" anchorCtr="0">
+              <a:noAutofit/>
+            </a:bodyPr>
+            <a:lstStyle/>
+            <a:p>
+              <a:pPr marL="0" marR="0" lvl="0" indent="0" algn="l" rtl="0">
+                <a:lnSpc>
+                  <a:spcPct val="90000"/>
+                </a:lnSpc>
+                <a:spcBef>
+                  <a:spcPts val="0"/>
+                </a:spcBef>
+                <a:spcAft>
+                  <a:spcPts val="0"/>
+                </a:spcAft>
+                <a:buNone/>
+              </a:pPr>
+              <a:r>
+                <a:rPr lang="es-ES" sz="3400" b="0" i="0" u="none" strike="noStrike" cap="none">
+                  <a:solidFill>
+                    <a:schemeClr val="dk1"/>
+                  </a:solidFill>
+                  <a:latin typeface="Trebuchet MS"/>
+                  <a:ea typeface="Trebuchet MS"/>
+                  <a:cs typeface="Trebuchet MS"/>
+                  <a:sym typeface="Trebuchet MS"/>
+                </a:rPr>
+                <a:t>* Beneficios</a:t>
+              </a:r>
+              <a:endParaRPr sz="3400" b="0" i="0" u="none" strike="noStrike" cap="none">
+                <a:solidFill>
+                  <a:schemeClr val="dk1"/>
+                </a:solidFill>
+                <a:latin typeface="Trebuchet MS"/>
+                <a:ea typeface="Trebuchet MS"/>
+                <a:cs typeface="Trebuchet MS"/>
+                <a:sym typeface="Trebuchet MS"/>
+              </a:endParaRPr>
+            </a:p>
+          </p:txBody>
+        </p:sp>
+        <p:cxnSp>
+          <p:nvCxnSpPr>
+            <p:cNvPr id="181" name="Shape 181"/>
+            <p:cNvCxnSpPr/>
+            <p:nvPr/>
+          </p:nvCxnSpPr>
+          <p:spPr>
+            <a:xfrm>
+              <a:off x="1719262" y="1424723"/>
+              <a:ext cx="6877049" cy="0"/>
+            </a:xfrm>
+            <a:prstGeom prst="straightConnector1">
+              <a:avLst/>
+            </a:prstGeom>
+            <a:solidFill>
+              <a:srgbClr val="90C223"/>
+            </a:solidFill>
+            <a:ln w="19050" cap="rnd" cmpd="sng">
+              <a:solidFill>
+                <a:srgbClr val="D1E3BB"/>
+              </a:solidFill>
+              <a:prstDash val="solid"/>
+              <a:round/>
+              <a:headEnd type="none" w="sm" len="sm"/>
+              <a:tailEnd type="none" w="sm" len="sm"/>
+            </a:ln>
+          </p:spPr>
+        </p:cxnSp>
+        <p:sp>
+          <p:nvSpPr>
+            <p:cNvPr id="182" name="Shape 182"/>
+            <p:cNvSpPr/>
+            <p:nvPr/>
+          </p:nvSpPr>
+          <p:spPr>
+            <a:xfrm>
+              <a:off x="1848207" y="1492567"/>
+              <a:ext cx="6748104" cy="1356879"/>
+            </a:xfrm>
+            <a:prstGeom prst="rect">
+              <a:avLst/>
+            </a:prstGeom>
+            <a:noFill/>
+            <a:ln>
+              <a:noFill/>
+            </a:ln>
+          </p:spPr>
+          <p:txBody>
+            <a:bodyPr spcFirstLastPara="1" wrap="square" lIns="91425" tIns="91425" rIns="91425" bIns="91425" anchor="ctr" anchorCtr="0">
+              <a:noAutofit/>
+            </a:bodyPr>
+            <a:lstStyle/>
+            <a:p>
+              <a:pPr marL="0" lvl="0" indent="0">
+                <a:spcBef>
+                  <a:spcPts val="0"/>
+                </a:spcBef>
+                <a:spcAft>
+                  <a:spcPts val="0"/>
+                </a:spcAft>
+                <a:buNone/>
+              </a:pPr>
+              <a:endParaRPr/>
+            </a:p>
+          </p:txBody>
+        </p:sp>
+        <p:sp>
+          <p:nvSpPr>
+            <p:cNvPr id="183" name="Shape 183"/>
+            <p:cNvSpPr txBox="1"/>
+            <p:nvPr/>
+          </p:nvSpPr>
+          <p:spPr>
+            <a:xfrm>
+              <a:off x="1848207" y="1492567"/>
+              <a:ext cx="6748104" cy="1356879"/>
+            </a:xfrm>
+            <a:prstGeom prst="rect">
+              <a:avLst/>
+            </a:prstGeom>
+            <a:noFill/>
+            <a:ln>
+              <a:noFill/>
+            </a:ln>
+          </p:spPr>
+          <p:txBody>
+            <a:bodyPr spcFirstLastPara="1" wrap="square" lIns="129525" tIns="129525" rIns="129525" bIns="129525" anchor="t" anchorCtr="0">
+              <a:noAutofit/>
+            </a:bodyPr>
+            <a:lstStyle/>
+            <a:p>
+              <a:pPr marL="0" marR="0" lvl="0" indent="0" algn="l" rtl="0">
+                <a:lnSpc>
+                  <a:spcPct val="90000"/>
+                </a:lnSpc>
+                <a:spcBef>
+                  <a:spcPts val="0"/>
+                </a:spcBef>
+                <a:spcAft>
+                  <a:spcPts val="0"/>
+                </a:spcAft>
+                <a:buNone/>
+              </a:pPr>
+              <a:r>
+                <a:rPr lang="es-ES" sz="3400" b="0" i="0" u="none" strike="noStrike" cap="none">
+                  <a:solidFill>
+                    <a:schemeClr val="dk1"/>
+                  </a:solidFill>
+                  <a:latin typeface="Trebuchet MS"/>
+                  <a:ea typeface="Trebuchet MS"/>
+                  <a:cs typeface="Trebuchet MS"/>
+                  <a:sym typeface="Trebuchet MS"/>
+                </a:rPr>
+                <a:t>* Proceso de la Automatización</a:t>
+              </a:r>
+              <a:endParaRPr sz="3400" b="0" i="0" u="none" strike="noStrike" cap="none">
+                <a:solidFill>
+                  <a:schemeClr val="dk1"/>
+                </a:solidFill>
+                <a:latin typeface="Trebuchet MS"/>
+                <a:ea typeface="Trebuchet MS"/>
+                <a:cs typeface="Trebuchet MS"/>
+                <a:sym typeface="Trebuchet MS"/>
+              </a:endParaRPr>
+            </a:p>
+          </p:txBody>
+        </p:sp>
+        <p:cxnSp>
+          <p:nvCxnSpPr>
+            <p:cNvPr id="184" name="Shape 184"/>
+            <p:cNvCxnSpPr/>
+            <p:nvPr/>
+          </p:nvCxnSpPr>
+          <p:spPr>
+            <a:xfrm>
+              <a:off x="1719262" y="2849446"/>
+              <a:ext cx="6877049" cy="0"/>
+            </a:xfrm>
+            <a:prstGeom prst="straightConnector1">
+              <a:avLst/>
+            </a:prstGeom>
+            <a:solidFill>
+              <a:srgbClr val="90C223"/>
+            </a:solidFill>
+            <a:ln w="19050" cap="rnd" cmpd="sng">
+              <a:solidFill>
+                <a:srgbClr val="D1E3BB"/>
+              </a:solidFill>
+              <a:prstDash val="solid"/>
+              <a:round/>
+              <a:headEnd type="none" w="sm" len="sm"/>
+              <a:tailEnd type="none" w="sm" len="sm"/>
+            </a:ln>
+          </p:spPr>
+        </p:cxnSp>
+        <p:sp>
+          <p:nvSpPr>
+            <p:cNvPr id="185" name="Shape 185"/>
+            <p:cNvSpPr/>
+            <p:nvPr/>
+          </p:nvSpPr>
+          <p:spPr>
+            <a:xfrm>
+              <a:off x="1848207" y="2917290"/>
+              <a:ext cx="6748104" cy="1356879"/>
+            </a:xfrm>
+            <a:prstGeom prst="rect">
+              <a:avLst/>
+            </a:prstGeom>
+            <a:noFill/>
+            <a:ln>
+              <a:noFill/>
+            </a:ln>
+          </p:spPr>
+          <p:txBody>
+            <a:bodyPr spcFirstLastPara="1" wrap="square" lIns="91425" tIns="91425" rIns="91425" bIns="91425" anchor="ctr" anchorCtr="0">
+              <a:noAutofit/>
+            </a:bodyPr>
+            <a:lstStyle/>
+            <a:p>
+              <a:pPr marL="0" lvl="0" indent="0">
+                <a:spcBef>
+                  <a:spcPts val="0"/>
+                </a:spcBef>
+                <a:spcAft>
+                  <a:spcPts val="0"/>
+                </a:spcAft>
+                <a:buNone/>
+              </a:pPr>
+              <a:endParaRPr/>
+            </a:p>
+          </p:txBody>
+        </p:sp>
+        <p:sp>
+          <p:nvSpPr>
+            <p:cNvPr id="186" name="Shape 186"/>
+            <p:cNvSpPr txBox="1"/>
+            <p:nvPr/>
+          </p:nvSpPr>
+          <p:spPr>
+            <a:xfrm>
+              <a:off x="1848207" y="2917290"/>
+              <a:ext cx="6748104" cy="1356879"/>
+            </a:xfrm>
+            <a:prstGeom prst="rect">
+              <a:avLst/>
+            </a:prstGeom>
+            <a:noFill/>
+            <a:ln>
+              <a:noFill/>
+            </a:ln>
+          </p:spPr>
+          <p:txBody>
+            <a:bodyPr spcFirstLastPara="1" wrap="square" lIns="129525" tIns="129525" rIns="129525" bIns="129525" anchor="t" anchorCtr="0">
+              <a:noAutofit/>
+            </a:bodyPr>
+            <a:lstStyle/>
+            <a:p>
+              <a:pPr marL="0" marR="0" lvl="0" indent="0" algn="l" rtl="0">
+                <a:lnSpc>
+                  <a:spcPct val="90000"/>
+                </a:lnSpc>
+                <a:spcBef>
+                  <a:spcPts val="0"/>
+                </a:spcBef>
+                <a:spcAft>
+                  <a:spcPts val="0"/>
+                </a:spcAft>
+                <a:buNone/>
+              </a:pPr>
+              <a:r>
+                <a:rPr lang="es-ES" sz="3400" b="0" i="0" u="none" strike="noStrike" cap="none">
+                  <a:solidFill>
+                    <a:schemeClr val="dk1"/>
+                  </a:solidFill>
+                  <a:latin typeface="Trebuchet MS"/>
+                  <a:ea typeface="Trebuchet MS"/>
+                  <a:cs typeface="Trebuchet MS"/>
+                  <a:sym typeface="Trebuchet MS"/>
+                </a:rPr>
+                <a:t>* Creación de una infraestructura de automatización.</a:t>
+              </a:r>
+              <a:endParaRPr sz="3400" b="0" i="0" u="none" strike="noStrike" cap="none">
+                <a:solidFill>
+                  <a:schemeClr val="dk1"/>
+                </a:solidFill>
+                <a:latin typeface="Trebuchet MS"/>
+                <a:ea typeface="Trebuchet MS"/>
+                <a:cs typeface="Trebuchet MS"/>
+                <a:sym typeface="Trebuchet MS"/>
+              </a:endParaRPr>
+            </a:p>
+          </p:txBody>
+        </p:sp>
+        <p:cxnSp>
+          <p:nvCxnSpPr>
+            <p:cNvPr id="187" name="Shape 187"/>
+            <p:cNvCxnSpPr/>
+            <p:nvPr/>
+          </p:nvCxnSpPr>
+          <p:spPr>
+            <a:xfrm>
+              <a:off x="1719262" y="4274170"/>
+              <a:ext cx="6877049" cy="0"/>
+            </a:xfrm>
+            <a:prstGeom prst="straightConnector1">
+              <a:avLst/>
+            </a:prstGeom>
+            <a:solidFill>
+              <a:srgbClr val="90C223"/>
+            </a:solidFill>
+            <a:ln w="19050" cap="rnd" cmpd="sng">
+              <a:solidFill>
+                <a:srgbClr val="D1E3BB"/>
+              </a:solidFill>
+              <a:prstDash val="solid"/>
+              <a:round/>
+              <a:headEnd type="none" w="sm" len="sm"/>
+              <a:tailEnd type="none" w="sm" len="sm"/>
+            </a:ln>
+          </p:spPr>
+        </p:cxnSp>
+      </p:grpSp>
+    </p:spTree>
+  </p:cSld>
+  <p:clrMapOvr>
+    <a:masterClrMapping/>
+  </p:clrMapOvr>
+</p:sld>
+</file>
+
+<file path=ppt/slides/slide30.xml><?xml version="1.0" encoding="utf-8"?>
 <p:sld xmlns:a="http://schemas.openxmlformats.org/drawingml/2006/main" xmlns:r="http://schemas.openxmlformats.org/officeDocument/2006/relationships" xmlns:p="http://schemas.openxmlformats.org/presentationml/2006/main">
   <p:cSld>
     <p:spTree>
@@ -29304,7 +30356,7 @@
 </p:sld>
 </file>
 
-<file path=ppt/slides/slide26.xml><?xml version="1.0" encoding="utf-8"?>
+<file path=ppt/slides/slide31.xml><?xml version="1.0" encoding="utf-8"?>
 <p:sld xmlns:a="http://schemas.openxmlformats.org/drawingml/2006/main" xmlns:r="http://schemas.openxmlformats.org/officeDocument/2006/relationships" xmlns:p="http://schemas.openxmlformats.org/presentationml/2006/main">
   <p:cSld>
     <p:spTree>
@@ -29520,620 +30572,6 @@
 </p:sld>
 </file>
 
-<file path=ppt/slides/slide3.xml><?xml version="1.0" encoding="utf-8"?>
-<p:sld xmlns:a="http://schemas.openxmlformats.org/drawingml/2006/main" xmlns:r="http://schemas.openxmlformats.org/officeDocument/2006/relationships" xmlns:p="http://schemas.openxmlformats.org/presentationml/2006/main">
-  <p:cSld>
-    <p:spTree>
-      <p:nvGrpSpPr>
-        <p:cNvPr id="1" name="Shape 173"/>
-        <p:cNvGrpSpPr/>
-        <p:nvPr/>
-      </p:nvGrpSpPr>
-      <p:grpSpPr>
-        <a:xfrm>
-          <a:off x="0" y="0"/>
-          <a:ext cx="0" cy="0"/>
-          <a:chOff x="0" y="0"/>
-          <a:chExt cx="0" cy="0"/>
-        </a:xfrm>
-      </p:grpSpPr>
-      <p:sp>
-        <p:nvSpPr>
-          <p:cNvPr id="174" name="Shape 174"/>
-          <p:cNvSpPr txBox="1">
-            <a:spLocks noGrp="1"/>
-          </p:cNvSpPr>
-          <p:nvPr>
-            <p:ph type="title"/>
-          </p:nvPr>
-        </p:nvSpPr>
-        <p:spPr>
-          <a:xfrm>
-            <a:off x="677334" y="609600"/>
-            <a:ext cx="8596668" cy="845713"/>
-          </a:xfrm>
-          <a:prstGeom prst="rect">
-            <a:avLst/>
-          </a:prstGeom>
-          <a:noFill/>
-          <a:ln>
-            <a:noFill/>
-          </a:ln>
-        </p:spPr>
-        <p:txBody>
-          <a:bodyPr spcFirstLastPara="1" wrap="square" lIns="91425" tIns="45700" rIns="91425" bIns="45700" anchor="t" anchorCtr="0">
-            <a:noAutofit/>
-          </a:bodyPr>
-          <a:lstStyle/>
-          <a:p>
-            <a:pPr marL="0" marR="0" lvl="0" indent="0" algn="l" rtl="0">
-              <a:spcBef>
-                <a:spcPts val="0"/>
-              </a:spcBef>
-              <a:spcAft>
-                <a:spcPts val="0"/>
-              </a:spcAft>
-              <a:buClr>
-                <a:schemeClr val="accent1"/>
-              </a:buClr>
-              <a:buFont typeface="Trebuchet MS"/>
-              <a:buNone/>
-            </a:pPr>
-            <a:r>
-              <a:rPr lang="es-ES" sz="3600" b="0" i="0" u="none" strike="noStrike" cap="none">
-                <a:solidFill>
-                  <a:schemeClr val="accent1"/>
-                </a:solidFill>
-                <a:latin typeface="Trebuchet MS"/>
-                <a:ea typeface="Trebuchet MS"/>
-                <a:cs typeface="Trebuchet MS"/>
-                <a:sym typeface="Trebuchet MS"/>
-              </a:rPr>
-              <a:t>Visión general de automatización</a:t>
-            </a:r>
-            <a:endParaRPr sz="3600" b="0" i="0" u="none" strike="noStrike" cap="none">
-              <a:solidFill>
-                <a:schemeClr val="accent1"/>
-              </a:solidFill>
-              <a:latin typeface="Trebuchet MS"/>
-              <a:ea typeface="Trebuchet MS"/>
-              <a:cs typeface="Trebuchet MS"/>
-              <a:sym typeface="Trebuchet MS"/>
-            </a:endParaRPr>
-          </a:p>
-        </p:txBody>
-      </p:sp>
-      <p:grpSp>
-        <p:nvGrpSpPr>
-          <p:cNvPr id="175" name="Shape 175"/>
-          <p:cNvGrpSpPr/>
-          <p:nvPr/>
-        </p:nvGrpSpPr>
-        <p:grpSpPr>
-          <a:xfrm>
-            <a:off x="677863" y="1700012"/>
-            <a:ext cx="8596312" cy="4342014"/>
-            <a:chOff x="0" y="0"/>
-            <a:chExt cx="8596312" cy="4342014"/>
-          </a:xfrm>
-        </p:grpSpPr>
-        <p:cxnSp>
-          <p:nvCxnSpPr>
-            <p:cNvPr id="176" name="Shape 176"/>
-            <p:cNvCxnSpPr/>
-            <p:nvPr/>
-          </p:nvCxnSpPr>
-          <p:spPr>
-            <a:xfrm>
-              <a:off x="0" y="0"/>
-              <a:ext cx="8596312" cy="0"/>
-            </a:xfrm>
-            <a:prstGeom prst="straightConnector1">
-              <a:avLst/>
-            </a:prstGeom>
-            <a:solidFill>
-              <a:srgbClr val="90C223"/>
-            </a:solidFill>
-            <a:ln w="19050" cap="rnd" cmpd="sng">
-              <a:solidFill>
-                <a:srgbClr val="90C223"/>
-              </a:solidFill>
-              <a:prstDash val="solid"/>
-              <a:round/>
-              <a:headEnd type="none" w="sm" len="sm"/>
-              <a:tailEnd type="none" w="sm" len="sm"/>
-            </a:ln>
-          </p:spPr>
-        </p:cxnSp>
-        <p:sp>
-          <p:nvSpPr>
-            <p:cNvPr id="177" name="Shape 177"/>
-            <p:cNvSpPr/>
-            <p:nvPr/>
-          </p:nvSpPr>
-          <p:spPr>
-            <a:xfrm>
-              <a:off x="0" y="0"/>
-              <a:ext cx="1719262" cy="4342014"/>
-            </a:xfrm>
-            <a:prstGeom prst="rect">
-              <a:avLst/>
-            </a:prstGeom>
-            <a:noFill/>
-            <a:ln>
-              <a:noFill/>
-            </a:ln>
-          </p:spPr>
-          <p:txBody>
-            <a:bodyPr spcFirstLastPara="1" wrap="square" lIns="91425" tIns="91425" rIns="91425" bIns="91425" anchor="ctr" anchorCtr="0">
-              <a:noAutofit/>
-            </a:bodyPr>
-            <a:lstStyle/>
-            <a:p>
-              <a:pPr marL="0" lvl="0" indent="0">
-                <a:spcBef>
-                  <a:spcPts val="0"/>
-                </a:spcBef>
-                <a:spcAft>
-                  <a:spcPts val="0"/>
-                </a:spcAft>
-                <a:buNone/>
-              </a:pPr>
-              <a:endParaRPr/>
-            </a:p>
-          </p:txBody>
-        </p:sp>
-        <p:sp>
-          <p:nvSpPr>
-            <p:cNvPr id="178" name="Shape 178"/>
-            <p:cNvSpPr txBox="1"/>
-            <p:nvPr/>
-          </p:nvSpPr>
-          <p:spPr>
-            <a:xfrm>
-              <a:off x="0" y="0"/>
-              <a:ext cx="1719262" cy="4342014"/>
-            </a:xfrm>
-            <a:prstGeom prst="rect">
-              <a:avLst/>
-            </a:prstGeom>
-            <a:noFill/>
-            <a:ln>
-              <a:noFill/>
-            </a:ln>
-          </p:spPr>
-          <p:txBody>
-            <a:bodyPr spcFirstLastPara="1" wrap="square" lIns="64750" tIns="64750" rIns="64750" bIns="64750" anchor="t" anchorCtr="0">
-              <a:noAutofit/>
-            </a:bodyPr>
-            <a:lstStyle/>
-            <a:p>
-              <a:pPr marL="0" marR="0" lvl="0" indent="0" algn="l" rtl="0">
-                <a:lnSpc>
-                  <a:spcPct val="90000"/>
-                </a:lnSpc>
-                <a:spcBef>
-                  <a:spcPts val="0"/>
-                </a:spcBef>
-                <a:spcAft>
-                  <a:spcPts val="0"/>
-                </a:spcAft>
-                <a:buNone/>
-              </a:pPr>
-              <a:r>
-                <a:rPr lang="es-ES" sz="1700" b="0" i="0" u="none" strike="noStrike" cap="none">
-                  <a:solidFill>
-                    <a:schemeClr val="dk1"/>
-                  </a:solidFill>
-                  <a:latin typeface="Trebuchet MS"/>
-                  <a:ea typeface="Trebuchet MS"/>
-                  <a:cs typeface="Trebuchet MS"/>
-                  <a:sym typeface="Trebuchet MS"/>
-                </a:rPr>
-                <a:t>Visión general de Automatización</a:t>
-              </a:r>
-              <a:endParaRPr sz="1700" b="0" i="0" u="none" strike="noStrike" cap="none">
-                <a:solidFill>
-                  <a:schemeClr val="dk1"/>
-                </a:solidFill>
-                <a:latin typeface="Trebuchet MS"/>
-                <a:ea typeface="Trebuchet MS"/>
-                <a:cs typeface="Trebuchet MS"/>
-                <a:sym typeface="Trebuchet MS"/>
-              </a:endParaRPr>
-            </a:p>
-          </p:txBody>
-        </p:sp>
-        <p:sp>
-          <p:nvSpPr>
-            <p:cNvPr id="179" name="Shape 179"/>
-            <p:cNvSpPr/>
-            <p:nvPr/>
-          </p:nvSpPr>
-          <p:spPr>
-            <a:xfrm>
-              <a:off x="1848207" y="67843"/>
-              <a:ext cx="6748104" cy="1356879"/>
-            </a:xfrm>
-            <a:prstGeom prst="rect">
-              <a:avLst/>
-            </a:prstGeom>
-            <a:noFill/>
-            <a:ln>
-              <a:noFill/>
-            </a:ln>
-          </p:spPr>
-          <p:txBody>
-            <a:bodyPr spcFirstLastPara="1" wrap="square" lIns="91425" tIns="91425" rIns="91425" bIns="91425" anchor="ctr" anchorCtr="0">
-              <a:noAutofit/>
-            </a:bodyPr>
-            <a:lstStyle/>
-            <a:p>
-              <a:pPr marL="0" lvl="0" indent="0">
-                <a:spcBef>
-                  <a:spcPts val="0"/>
-                </a:spcBef>
-                <a:spcAft>
-                  <a:spcPts val="0"/>
-                </a:spcAft>
-                <a:buNone/>
-              </a:pPr>
-              <a:endParaRPr/>
-            </a:p>
-          </p:txBody>
-        </p:sp>
-        <p:sp>
-          <p:nvSpPr>
-            <p:cNvPr id="180" name="Shape 180"/>
-            <p:cNvSpPr txBox="1"/>
-            <p:nvPr/>
-          </p:nvSpPr>
-          <p:spPr>
-            <a:xfrm>
-              <a:off x="1848207" y="67843"/>
-              <a:ext cx="6748104" cy="1356879"/>
-            </a:xfrm>
-            <a:prstGeom prst="rect">
-              <a:avLst/>
-            </a:prstGeom>
-            <a:noFill/>
-            <a:ln>
-              <a:noFill/>
-            </a:ln>
-          </p:spPr>
-          <p:txBody>
-            <a:bodyPr spcFirstLastPara="1" wrap="square" lIns="129525" tIns="129525" rIns="129525" bIns="129525" anchor="t" anchorCtr="0">
-              <a:noAutofit/>
-            </a:bodyPr>
-            <a:lstStyle/>
-            <a:p>
-              <a:pPr marL="0" marR="0" lvl="0" indent="0" algn="l" rtl="0">
-                <a:lnSpc>
-                  <a:spcPct val="90000"/>
-                </a:lnSpc>
-                <a:spcBef>
-                  <a:spcPts val="0"/>
-                </a:spcBef>
-                <a:spcAft>
-                  <a:spcPts val="0"/>
-                </a:spcAft>
-                <a:buNone/>
-              </a:pPr>
-              <a:r>
-                <a:rPr lang="es-ES" sz="3400" b="0" i="0" u="none" strike="noStrike" cap="none">
-                  <a:solidFill>
-                    <a:schemeClr val="dk1"/>
-                  </a:solidFill>
-                  <a:latin typeface="Trebuchet MS"/>
-                  <a:ea typeface="Trebuchet MS"/>
-                  <a:cs typeface="Trebuchet MS"/>
-                  <a:sym typeface="Trebuchet MS"/>
-                </a:rPr>
-                <a:t>* Beneficios</a:t>
-              </a:r>
-              <a:endParaRPr sz="3400" b="0" i="0" u="none" strike="noStrike" cap="none">
-                <a:solidFill>
-                  <a:schemeClr val="dk1"/>
-                </a:solidFill>
-                <a:latin typeface="Trebuchet MS"/>
-                <a:ea typeface="Trebuchet MS"/>
-                <a:cs typeface="Trebuchet MS"/>
-                <a:sym typeface="Trebuchet MS"/>
-              </a:endParaRPr>
-            </a:p>
-          </p:txBody>
-        </p:sp>
-        <p:cxnSp>
-          <p:nvCxnSpPr>
-            <p:cNvPr id="181" name="Shape 181"/>
-            <p:cNvCxnSpPr/>
-            <p:nvPr/>
-          </p:nvCxnSpPr>
-          <p:spPr>
-            <a:xfrm>
-              <a:off x="1719262" y="1424723"/>
-              <a:ext cx="6877049" cy="0"/>
-            </a:xfrm>
-            <a:prstGeom prst="straightConnector1">
-              <a:avLst/>
-            </a:prstGeom>
-            <a:solidFill>
-              <a:srgbClr val="90C223"/>
-            </a:solidFill>
-            <a:ln w="19050" cap="rnd" cmpd="sng">
-              <a:solidFill>
-                <a:srgbClr val="D1E3BB"/>
-              </a:solidFill>
-              <a:prstDash val="solid"/>
-              <a:round/>
-              <a:headEnd type="none" w="sm" len="sm"/>
-              <a:tailEnd type="none" w="sm" len="sm"/>
-            </a:ln>
-          </p:spPr>
-        </p:cxnSp>
-        <p:sp>
-          <p:nvSpPr>
-            <p:cNvPr id="182" name="Shape 182"/>
-            <p:cNvSpPr/>
-            <p:nvPr/>
-          </p:nvSpPr>
-          <p:spPr>
-            <a:xfrm>
-              <a:off x="1848207" y="1492567"/>
-              <a:ext cx="6748104" cy="1356879"/>
-            </a:xfrm>
-            <a:prstGeom prst="rect">
-              <a:avLst/>
-            </a:prstGeom>
-            <a:noFill/>
-            <a:ln>
-              <a:noFill/>
-            </a:ln>
-          </p:spPr>
-          <p:txBody>
-            <a:bodyPr spcFirstLastPara="1" wrap="square" lIns="91425" tIns="91425" rIns="91425" bIns="91425" anchor="ctr" anchorCtr="0">
-              <a:noAutofit/>
-            </a:bodyPr>
-            <a:lstStyle/>
-            <a:p>
-              <a:pPr marL="0" lvl="0" indent="0">
-                <a:spcBef>
-                  <a:spcPts val="0"/>
-                </a:spcBef>
-                <a:spcAft>
-                  <a:spcPts val="0"/>
-                </a:spcAft>
-                <a:buNone/>
-              </a:pPr>
-              <a:endParaRPr/>
-            </a:p>
-          </p:txBody>
-        </p:sp>
-        <p:sp>
-          <p:nvSpPr>
-            <p:cNvPr id="183" name="Shape 183"/>
-            <p:cNvSpPr txBox="1"/>
-            <p:nvPr/>
-          </p:nvSpPr>
-          <p:spPr>
-            <a:xfrm>
-              <a:off x="1848207" y="1492567"/>
-              <a:ext cx="6748104" cy="1356879"/>
-            </a:xfrm>
-            <a:prstGeom prst="rect">
-              <a:avLst/>
-            </a:prstGeom>
-            <a:noFill/>
-            <a:ln>
-              <a:noFill/>
-            </a:ln>
-          </p:spPr>
-          <p:txBody>
-            <a:bodyPr spcFirstLastPara="1" wrap="square" lIns="129525" tIns="129525" rIns="129525" bIns="129525" anchor="t" anchorCtr="0">
-              <a:noAutofit/>
-            </a:bodyPr>
-            <a:lstStyle/>
-            <a:p>
-              <a:pPr marL="0" marR="0" lvl="0" indent="0" algn="l" rtl="0">
-                <a:lnSpc>
-                  <a:spcPct val="90000"/>
-                </a:lnSpc>
-                <a:spcBef>
-                  <a:spcPts val="0"/>
-                </a:spcBef>
-                <a:spcAft>
-                  <a:spcPts val="0"/>
-                </a:spcAft>
-                <a:buNone/>
-              </a:pPr>
-              <a:r>
-                <a:rPr lang="es-ES" sz="3400" b="0" i="0" u="none" strike="noStrike" cap="none">
-                  <a:solidFill>
-                    <a:schemeClr val="dk1"/>
-                  </a:solidFill>
-                  <a:latin typeface="Trebuchet MS"/>
-                  <a:ea typeface="Trebuchet MS"/>
-                  <a:cs typeface="Trebuchet MS"/>
-                  <a:sym typeface="Trebuchet MS"/>
-                </a:rPr>
-                <a:t>* Proceso de la Automatización</a:t>
-              </a:r>
-              <a:endParaRPr sz="3400" b="0" i="0" u="none" strike="noStrike" cap="none">
-                <a:solidFill>
-                  <a:schemeClr val="dk1"/>
-                </a:solidFill>
-                <a:latin typeface="Trebuchet MS"/>
-                <a:ea typeface="Trebuchet MS"/>
-                <a:cs typeface="Trebuchet MS"/>
-                <a:sym typeface="Trebuchet MS"/>
-              </a:endParaRPr>
-            </a:p>
-          </p:txBody>
-        </p:sp>
-        <p:cxnSp>
-          <p:nvCxnSpPr>
-            <p:cNvPr id="184" name="Shape 184"/>
-            <p:cNvCxnSpPr/>
-            <p:nvPr/>
-          </p:nvCxnSpPr>
-          <p:spPr>
-            <a:xfrm>
-              <a:off x="1719262" y="2849446"/>
-              <a:ext cx="6877049" cy="0"/>
-            </a:xfrm>
-            <a:prstGeom prst="straightConnector1">
-              <a:avLst/>
-            </a:prstGeom>
-            <a:solidFill>
-              <a:srgbClr val="90C223"/>
-            </a:solidFill>
-            <a:ln w="19050" cap="rnd" cmpd="sng">
-              <a:solidFill>
-                <a:srgbClr val="D1E3BB"/>
-              </a:solidFill>
-              <a:prstDash val="solid"/>
-              <a:round/>
-              <a:headEnd type="none" w="sm" len="sm"/>
-              <a:tailEnd type="none" w="sm" len="sm"/>
-            </a:ln>
-          </p:spPr>
-        </p:cxnSp>
-        <p:sp>
-          <p:nvSpPr>
-            <p:cNvPr id="185" name="Shape 185"/>
-            <p:cNvSpPr/>
-            <p:nvPr/>
-          </p:nvSpPr>
-          <p:spPr>
-            <a:xfrm>
-              <a:off x="1848207" y="2917290"/>
-              <a:ext cx="6748104" cy="1356879"/>
-            </a:xfrm>
-            <a:prstGeom prst="rect">
-              <a:avLst/>
-            </a:prstGeom>
-            <a:noFill/>
-            <a:ln>
-              <a:noFill/>
-            </a:ln>
-          </p:spPr>
-          <p:txBody>
-            <a:bodyPr spcFirstLastPara="1" wrap="square" lIns="91425" tIns="91425" rIns="91425" bIns="91425" anchor="ctr" anchorCtr="0">
-              <a:noAutofit/>
-            </a:bodyPr>
-            <a:lstStyle/>
-            <a:p>
-              <a:pPr marL="0" lvl="0" indent="0">
-                <a:spcBef>
-                  <a:spcPts val="0"/>
-                </a:spcBef>
-                <a:spcAft>
-                  <a:spcPts val="0"/>
-                </a:spcAft>
-                <a:buNone/>
-              </a:pPr>
-              <a:endParaRPr/>
-            </a:p>
-          </p:txBody>
-        </p:sp>
-        <p:sp>
-          <p:nvSpPr>
-            <p:cNvPr id="186" name="Shape 186"/>
-            <p:cNvSpPr txBox="1"/>
-            <p:nvPr/>
-          </p:nvSpPr>
-          <p:spPr>
-            <a:xfrm>
-              <a:off x="1848207" y="2917290"/>
-              <a:ext cx="6748104" cy="1356879"/>
-            </a:xfrm>
-            <a:prstGeom prst="rect">
-              <a:avLst/>
-            </a:prstGeom>
-            <a:noFill/>
-            <a:ln>
-              <a:noFill/>
-            </a:ln>
-          </p:spPr>
-          <p:txBody>
-            <a:bodyPr spcFirstLastPara="1" wrap="square" lIns="129525" tIns="129525" rIns="129525" bIns="129525" anchor="t" anchorCtr="0">
-              <a:noAutofit/>
-            </a:bodyPr>
-            <a:lstStyle/>
-            <a:p>
-              <a:pPr marL="0" marR="0" lvl="0" indent="0" algn="l" rtl="0">
-                <a:lnSpc>
-                  <a:spcPct val="90000"/>
-                </a:lnSpc>
-                <a:spcBef>
-                  <a:spcPts val="0"/>
-                </a:spcBef>
-                <a:spcAft>
-                  <a:spcPts val="0"/>
-                </a:spcAft>
-                <a:buNone/>
-              </a:pPr>
-              <a:r>
-                <a:rPr lang="es-ES" sz="3400" b="0" i="0" u="none" strike="noStrike" cap="none">
-                  <a:solidFill>
-                    <a:schemeClr val="dk1"/>
-                  </a:solidFill>
-                  <a:latin typeface="Trebuchet MS"/>
-                  <a:ea typeface="Trebuchet MS"/>
-                  <a:cs typeface="Trebuchet MS"/>
-                  <a:sym typeface="Trebuchet MS"/>
-                </a:rPr>
-                <a:t>* Creación de una infraestructura de automatización.</a:t>
-              </a:r>
-              <a:endParaRPr sz="3400" b="0" i="0" u="none" strike="noStrike" cap="none">
-                <a:solidFill>
-                  <a:schemeClr val="dk1"/>
-                </a:solidFill>
-                <a:latin typeface="Trebuchet MS"/>
-                <a:ea typeface="Trebuchet MS"/>
-                <a:cs typeface="Trebuchet MS"/>
-                <a:sym typeface="Trebuchet MS"/>
-              </a:endParaRPr>
-            </a:p>
-          </p:txBody>
-        </p:sp>
-        <p:cxnSp>
-          <p:nvCxnSpPr>
-            <p:cNvPr id="187" name="Shape 187"/>
-            <p:cNvCxnSpPr/>
-            <p:nvPr/>
-          </p:nvCxnSpPr>
-          <p:spPr>
-            <a:xfrm>
-              <a:off x="1719262" y="4274170"/>
-              <a:ext cx="6877049" cy="0"/>
-            </a:xfrm>
-            <a:prstGeom prst="straightConnector1">
-              <a:avLst/>
-            </a:prstGeom>
-            <a:solidFill>
-              <a:srgbClr val="90C223"/>
-            </a:solidFill>
-            <a:ln w="19050" cap="rnd" cmpd="sng">
-              <a:solidFill>
-                <a:srgbClr val="D1E3BB"/>
-              </a:solidFill>
-              <a:prstDash val="solid"/>
-              <a:round/>
-              <a:headEnd type="none" w="sm" len="sm"/>
-              <a:tailEnd type="none" w="sm" len="sm"/>
-            </a:ln>
-          </p:spPr>
-        </p:cxnSp>
-      </p:grpSp>
-    </p:spTree>
-  </p:cSld>
-  <p:clrMapOvr>
-    <a:masterClrMapping/>
-  </p:clrMapOvr>
-</p:sld>
-</file>
-
 <file path=ppt/slides/slide4.xml><?xml version="1.0" encoding="utf-8"?>
 <p:sld xmlns:a="http://schemas.openxmlformats.org/drawingml/2006/main" xmlns:r="http://schemas.openxmlformats.org/officeDocument/2006/relationships" xmlns:p="http://schemas.openxmlformats.org/presentationml/2006/main">
   <p:cSld>
@@ -31097,7 +31535,7 @@
               <a:buNone/>
             </a:pPr>
             <a:r>
-              <a:rPr lang="es-ES" sz="3600" b="0" i="0" u="none" strike="noStrike" cap="none">
+              <a:rPr lang="es-ES" sz="3600" b="0" i="0" u="none" strike="noStrike" cap="none" dirty="0">
                 <a:solidFill>
                   <a:schemeClr val="accent1"/>
                 </a:solidFill>
@@ -31106,9 +31544,9 @@
                 <a:cs typeface="Trebuchet MS"/>
                 <a:sym typeface="Trebuchet MS"/>
               </a:rPr>
-              <a:t>Proceso de automatización</a:t>
+              <a:t>Proceso de Automatización (PA)</a:t>
             </a:r>
-            <a:endParaRPr sz="3600" b="0" i="0" u="none" strike="noStrike" cap="none">
+            <a:endParaRPr sz="3600" b="0" i="0" u="none" strike="noStrike" cap="none" dirty="0">
               <a:solidFill>
                 <a:schemeClr val="accent1"/>
               </a:solidFill>
@@ -31651,7 +32089,7 @@
                 <a:buNone/>
               </a:pPr>
               <a:r>
-                <a:rPr lang="es-ES" sz="1200" b="0" i="0" u="none" strike="noStrike" cap="none">
+                <a:rPr lang="es-ES" sz="1200" b="0" i="0" u="none" strike="noStrike" cap="none" dirty="0">
                   <a:solidFill>
                     <a:schemeClr val="dk1"/>
                   </a:solidFill>
@@ -31662,7 +32100,7 @@
                 </a:rPr>
                 <a:t>Crear los pasos de la prueba</a:t>
               </a:r>
-              <a:endParaRPr sz="1200" b="0" i="0" u="none" strike="noStrike" cap="none">
+              <a:endParaRPr sz="1200" b="0" i="0" u="none" strike="noStrike" cap="none" dirty="0">
                 <a:solidFill>
                   <a:schemeClr val="dk1"/>
                 </a:solidFill>
@@ -31847,7 +32285,7 @@
                 <a:buNone/>
               </a:pPr>
               <a:r>
-                <a:rPr lang="es-ES" sz="1200" b="0" i="0" u="none" strike="noStrike" cap="none">
+                <a:rPr lang="es-ES" sz="1200" b="0" i="0" u="none" strike="noStrike" cap="none" dirty="0">
                   <a:solidFill>
                     <a:schemeClr val="dk1"/>
                   </a:solidFill>
@@ -31858,7 +32296,7 @@
                 </a:rPr>
                 <a:t>Complementación de las pruebas</a:t>
               </a:r>
-              <a:endParaRPr sz="1200" b="0" i="0" u="none" strike="noStrike" cap="none">
+              <a:endParaRPr sz="1200" b="0" i="0" u="none" strike="noStrike" cap="none" dirty="0">
                 <a:solidFill>
                   <a:schemeClr val="dk1"/>
                 </a:solidFill>
@@ -32324,55 +32762,9 @@
             </a:pPr>
             <a:r>
               <a:rPr lang="es-ES" dirty="0"/>
-              <a:t>Análisis de la </a:t>
-            </a:r>
-            <a:r>
-              <a:rPr lang="es-ES" dirty="0" err="1"/>
-              <a:t>Aplicacion</a:t>
-            </a:r>
-            <a:r>
-              <a:rPr lang="es-ES" dirty="0"/>
-              <a:t> de Prueba</a:t>
+              <a:t>PA: Análisis de la Aplicación de Prueba</a:t>
             </a:r>
             <a:endParaRPr dirty="0"/>
-          </a:p>
-        </p:txBody>
-      </p:sp>
-      <p:sp>
-        <p:nvSpPr>
-          <p:cNvPr id="240" name="Shape 240"/>
-          <p:cNvSpPr txBox="1">
-            <a:spLocks noGrp="1"/>
-          </p:cNvSpPr>
-          <p:nvPr>
-            <p:ph type="body" idx="1"/>
-          </p:nvPr>
-        </p:nvSpPr>
-        <p:spPr>
-          <a:xfrm>
-            <a:off x="677334" y="2160589"/>
-            <a:ext cx="8596800" cy="3880800"/>
-          </a:xfrm>
-          <a:prstGeom prst="rect">
-            <a:avLst/>
-          </a:prstGeom>
-        </p:spPr>
-        <p:txBody>
-          <a:bodyPr spcFirstLastPara="1" wrap="square" lIns="91425" tIns="91425" rIns="91425" bIns="91425" anchor="t" anchorCtr="0">
-            <a:noAutofit/>
-          </a:bodyPr>
-          <a:lstStyle/>
-          <a:p>
-            <a:pPr marL="342900" lvl="0" indent="-251459">
-              <a:spcBef>
-                <a:spcPts val="1000"/>
-              </a:spcBef>
-              <a:spcAft>
-                <a:spcPts val="0"/>
-              </a:spcAft>
-              <a:buNone/>
-            </a:pPr>
-            <a:endParaRPr/>
           </a:p>
         </p:txBody>
       </p:sp>
@@ -32392,7 +32784,7 @@
         </p:blipFill>
         <p:spPr>
           <a:xfrm>
-            <a:off x="1532688" y="1270050"/>
+            <a:off x="1644983" y="1382345"/>
             <a:ext cx="6069075" cy="5177551"/>
           </a:xfrm>
           <a:prstGeom prst="rect">

</xml_diff>